<commit_message>
Update MERG Arduino SIG Turntable Part 1.pptx
</commit_message>
<xml_diff>
--- a/MERG Arduino SIG Turntable Part 1.pptx
+++ b/MERG Arduino SIG Turntable Part 1.pptx
@@ -5,17 +5,19 @@
     <p:sldMasterId id="2147483648" r:id="rId1"/>
   </p:sldMasterIdLst>
   <p:notesMasterIdLst>
-    <p:notesMasterId r:id="rId10"/>
+    <p:notesMasterId r:id="rId12"/>
   </p:notesMasterIdLst>
   <p:sldIdLst>
     <p:sldId id="256" r:id="rId2"/>
     <p:sldId id="257" r:id="rId3"/>
     <p:sldId id="327" r:id="rId4"/>
     <p:sldId id="328" r:id="rId5"/>
-    <p:sldId id="329" r:id="rId6"/>
-    <p:sldId id="330" r:id="rId7"/>
-    <p:sldId id="326" r:id="rId8"/>
-    <p:sldId id="313" r:id="rId9"/>
+    <p:sldId id="331" r:id="rId6"/>
+    <p:sldId id="329" r:id="rId7"/>
+    <p:sldId id="330" r:id="rId8"/>
+    <p:sldId id="332" r:id="rId9"/>
+    <p:sldId id="333" r:id="rId10"/>
+    <p:sldId id="326" r:id="rId11"/>
   </p:sldIdLst>
   <p:sldSz cx="9144000" cy="5143500" type="screen16x9"/>
   <p:notesSz cx="6858000" cy="9144000"/>
@@ -215,7 +217,7 @@
           <a:p>
             <a:fld id="{C8D18E60-4300-4729-A0D7-6AB984C3922D}" type="datetimeFigureOut">
               <a:rPr lang="en-US" smtClean="0"/>
-              <a:t>12/15/2022</a:t>
+              <a:t>12/16/2022</a:t>
             </a:fld>
             <a:endParaRPr lang="en-US"/>
           </a:p>
@@ -581,6 +583,90 @@
 </p:notes>
 </file>
 
+<file path=ppt/notesSlides/notesSlide10.xml><?xml version="1.0" encoding="utf-8"?>
+<p:notes xmlns:a="http://schemas.openxmlformats.org/drawingml/2006/main" xmlns:r="http://schemas.openxmlformats.org/officeDocument/2006/relationships" xmlns:p="http://schemas.openxmlformats.org/presentationml/2006/main">
+  <p:cSld>
+    <p:spTree>
+      <p:nvGrpSpPr>
+        <p:cNvPr id="1" name=""/>
+        <p:cNvGrpSpPr/>
+        <p:nvPr/>
+      </p:nvGrpSpPr>
+      <p:grpSpPr>
+        <a:xfrm>
+          <a:off x="0" y="0"/>
+          <a:ext cx="0" cy="0"/>
+          <a:chOff x="0" y="0"/>
+          <a:chExt cx="0" cy="0"/>
+        </a:xfrm>
+      </p:grpSpPr>
+      <p:sp>
+        <p:nvSpPr>
+          <p:cNvPr id="2" name="Slide Image Placeholder 1"/>
+          <p:cNvSpPr>
+            <a:spLocks noGrp="1" noRot="1" noChangeAspect="1"/>
+          </p:cNvSpPr>
+          <p:nvPr>
+            <p:ph type="sldImg"/>
+          </p:nvPr>
+        </p:nvSpPr>
+        <p:spPr/>
+      </p:sp>
+      <p:sp>
+        <p:nvSpPr>
+          <p:cNvPr id="3" name="Notes Placeholder 2"/>
+          <p:cNvSpPr>
+            <a:spLocks noGrp="1"/>
+          </p:cNvSpPr>
+          <p:nvPr>
+            <p:ph type="body" idx="1"/>
+          </p:nvPr>
+        </p:nvSpPr>
+        <p:spPr/>
+        <p:txBody>
+          <a:bodyPr/>
+          <a:lstStyle/>
+          <a:p>
+            <a:endParaRPr lang="en-US" dirty="0"/>
+          </a:p>
+        </p:txBody>
+      </p:sp>
+      <p:sp>
+        <p:nvSpPr>
+          <p:cNvPr id="4" name="Slide Number Placeholder 3"/>
+          <p:cNvSpPr>
+            <a:spLocks noGrp="1"/>
+          </p:cNvSpPr>
+          <p:nvPr>
+            <p:ph type="sldNum" sz="quarter" idx="5"/>
+          </p:nvPr>
+        </p:nvSpPr>
+        <p:spPr/>
+        <p:txBody>
+          <a:bodyPr/>
+          <a:lstStyle/>
+          <a:p>
+            <a:fld id="{AF533E96-F078-4B3D-A8F4-F1AF21EBC357}" type="slidenum">
+              <a:rPr lang="en-US" smtClean="0"/>
+              <a:t>10</a:t>
+            </a:fld>
+            <a:endParaRPr lang="en-US"/>
+          </a:p>
+        </p:txBody>
+      </p:sp>
+    </p:spTree>
+    <p:extLst>
+      <p:ext uri="{BB962C8B-B14F-4D97-AF65-F5344CB8AC3E}">
+        <p14:creationId xmlns:p14="http://schemas.microsoft.com/office/powerpoint/2010/main" val="3741177500"/>
+      </p:ext>
+    </p:extLst>
+  </p:cSld>
+  <p:clrMapOvr>
+    <a:masterClrMapping/>
+  </p:clrMapOvr>
+</p:notes>
+</file>
+
 <file path=ppt/notesSlides/notesSlide2.xml><?xml version="1.0" encoding="utf-8"?>
 <p:notes xmlns:a="http://schemas.openxmlformats.org/drawingml/2006/main" xmlns:r="http://schemas.openxmlformats.org/officeDocument/2006/relationships" xmlns:p="http://schemas.openxmlformats.org/presentationml/2006/main">
   <p:cSld>
@@ -984,7 +1070,7 @@
     </p:spTree>
     <p:extLst>
       <p:ext uri="{BB962C8B-B14F-4D97-AF65-F5344CB8AC3E}">
-        <p14:creationId xmlns:p14="http://schemas.microsoft.com/office/powerpoint/2010/main" val="4153891608"/>
+        <p14:creationId xmlns:p14="http://schemas.microsoft.com/office/powerpoint/2010/main" val="666316165"/>
       </p:ext>
     </p:extLst>
   </p:cSld>
@@ -1068,7 +1154,7 @@
     </p:spTree>
     <p:extLst>
       <p:ext uri="{BB962C8B-B14F-4D97-AF65-F5344CB8AC3E}">
-        <p14:creationId xmlns:p14="http://schemas.microsoft.com/office/powerpoint/2010/main" val="958322846"/>
+        <p14:creationId xmlns:p14="http://schemas.microsoft.com/office/powerpoint/2010/main" val="4153891608"/>
       </p:ext>
     </p:extLst>
   </p:cSld>
@@ -1152,7 +1238,175 @@
     </p:spTree>
     <p:extLst>
       <p:ext uri="{BB962C8B-B14F-4D97-AF65-F5344CB8AC3E}">
-        <p14:creationId xmlns:p14="http://schemas.microsoft.com/office/powerpoint/2010/main" val="3741177500"/>
+        <p14:creationId xmlns:p14="http://schemas.microsoft.com/office/powerpoint/2010/main" val="958322846"/>
+      </p:ext>
+    </p:extLst>
+  </p:cSld>
+  <p:clrMapOvr>
+    <a:masterClrMapping/>
+  </p:clrMapOvr>
+</p:notes>
+</file>
+
+<file path=ppt/notesSlides/notesSlide8.xml><?xml version="1.0" encoding="utf-8"?>
+<p:notes xmlns:a="http://schemas.openxmlformats.org/drawingml/2006/main" xmlns:r="http://schemas.openxmlformats.org/officeDocument/2006/relationships" xmlns:p="http://schemas.openxmlformats.org/presentationml/2006/main">
+  <p:cSld>
+    <p:spTree>
+      <p:nvGrpSpPr>
+        <p:cNvPr id="1" name=""/>
+        <p:cNvGrpSpPr/>
+        <p:nvPr/>
+      </p:nvGrpSpPr>
+      <p:grpSpPr>
+        <a:xfrm>
+          <a:off x="0" y="0"/>
+          <a:ext cx="0" cy="0"/>
+          <a:chOff x="0" y="0"/>
+          <a:chExt cx="0" cy="0"/>
+        </a:xfrm>
+      </p:grpSpPr>
+      <p:sp>
+        <p:nvSpPr>
+          <p:cNvPr id="2" name="Slide Image Placeholder 1"/>
+          <p:cNvSpPr>
+            <a:spLocks noGrp="1" noRot="1" noChangeAspect="1"/>
+          </p:cNvSpPr>
+          <p:nvPr>
+            <p:ph type="sldImg"/>
+          </p:nvPr>
+        </p:nvSpPr>
+        <p:spPr/>
+      </p:sp>
+      <p:sp>
+        <p:nvSpPr>
+          <p:cNvPr id="3" name="Notes Placeholder 2"/>
+          <p:cNvSpPr>
+            <a:spLocks noGrp="1"/>
+          </p:cNvSpPr>
+          <p:nvPr>
+            <p:ph type="body" idx="1"/>
+          </p:nvPr>
+        </p:nvSpPr>
+        <p:spPr/>
+        <p:txBody>
+          <a:bodyPr/>
+          <a:lstStyle/>
+          <a:p>
+            <a:endParaRPr lang="en-US" dirty="0"/>
+          </a:p>
+        </p:txBody>
+      </p:sp>
+      <p:sp>
+        <p:nvSpPr>
+          <p:cNvPr id="4" name="Slide Number Placeholder 3"/>
+          <p:cNvSpPr>
+            <a:spLocks noGrp="1"/>
+          </p:cNvSpPr>
+          <p:nvPr>
+            <p:ph type="sldNum" sz="quarter" idx="5"/>
+          </p:nvPr>
+        </p:nvSpPr>
+        <p:spPr/>
+        <p:txBody>
+          <a:bodyPr/>
+          <a:lstStyle/>
+          <a:p>
+            <a:fld id="{AF533E96-F078-4B3D-A8F4-F1AF21EBC357}" type="slidenum">
+              <a:rPr lang="en-US" smtClean="0"/>
+              <a:t>8</a:t>
+            </a:fld>
+            <a:endParaRPr lang="en-US"/>
+          </a:p>
+        </p:txBody>
+      </p:sp>
+    </p:spTree>
+    <p:extLst>
+      <p:ext uri="{BB962C8B-B14F-4D97-AF65-F5344CB8AC3E}">
+        <p14:creationId xmlns:p14="http://schemas.microsoft.com/office/powerpoint/2010/main" val="1720455602"/>
+      </p:ext>
+    </p:extLst>
+  </p:cSld>
+  <p:clrMapOvr>
+    <a:masterClrMapping/>
+  </p:clrMapOvr>
+</p:notes>
+</file>
+
+<file path=ppt/notesSlides/notesSlide9.xml><?xml version="1.0" encoding="utf-8"?>
+<p:notes xmlns:a="http://schemas.openxmlformats.org/drawingml/2006/main" xmlns:r="http://schemas.openxmlformats.org/officeDocument/2006/relationships" xmlns:p="http://schemas.openxmlformats.org/presentationml/2006/main">
+  <p:cSld>
+    <p:spTree>
+      <p:nvGrpSpPr>
+        <p:cNvPr id="1" name=""/>
+        <p:cNvGrpSpPr/>
+        <p:nvPr/>
+      </p:nvGrpSpPr>
+      <p:grpSpPr>
+        <a:xfrm>
+          <a:off x="0" y="0"/>
+          <a:ext cx="0" cy="0"/>
+          <a:chOff x="0" y="0"/>
+          <a:chExt cx="0" cy="0"/>
+        </a:xfrm>
+      </p:grpSpPr>
+      <p:sp>
+        <p:nvSpPr>
+          <p:cNvPr id="2" name="Slide Image Placeholder 1"/>
+          <p:cNvSpPr>
+            <a:spLocks noGrp="1" noRot="1" noChangeAspect="1"/>
+          </p:cNvSpPr>
+          <p:nvPr>
+            <p:ph type="sldImg"/>
+          </p:nvPr>
+        </p:nvSpPr>
+        <p:spPr/>
+      </p:sp>
+      <p:sp>
+        <p:nvSpPr>
+          <p:cNvPr id="3" name="Notes Placeholder 2"/>
+          <p:cNvSpPr>
+            <a:spLocks noGrp="1"/>
+          </p:cNvSpPr>
+          <p:nvPr>
+            <p:ph type="body" idx="1"/>
+          </p:nvPr>
+        </p:nvSpPr>
+        <p:spPr/>
+        <p:txBody>
+          <a:bodyPr/>
+          <a:lstStyle/>
+          <a:p>
+            <a:endParaRPr lang="en-US" dirty="0"/>
+          </a:p>
+        </p:txBody>
+      </p:sp>
+      <p:sp>
+        <p:nvSpPr>
+          <p:cNvPr id="4" name="Slide Number Placeholder 3"/>
+          <p:cNvSpPr>
+            <a:spLocks noGrp="1"/>
+          </p:cNvSpPr>
+          <p:nvPr>
+            <p:ph type="sldNum" sz="quarter" idx="5"/>
+          </p:nvPr>
+        </p:nvSpPr>
+        <p:spPr/>
+        <p:txBody>
+          <a:bodyPr/>
+          <a:lstStyle/>
+          <a:p>
+            <a:fld id="{AF533E96-F078-4B3D-A8F4-F1AF21EBC357}" type="slidenum">
+              <a:rPr lang="en-US" smtClean="0"/>
+              <a:t>9</a:t>
+            </a:fld>
+            <a:endParaRPr lang="en-US"/>
+          </a:p>
+        </p:txBody>
+      </p:sp>
+    </p:spTree>
+    <p:extLst>
+      <p:ext uri="{BB962C8B-B14F-4D97-AF65-F5344CB8AC3E}">
+        <p14:creationId xmlns:p14="http://schemas.microsoft.com/office/powerpoint/2010/main" val="4042538672"/>
       </p:ext>
     </p:extLst>
   </p:cSld>
@@ -1387,7 +1641,7 @@
             <a:fld id="{53074F12-AA26-4AC8-9962-C36BB8F32554}" type="datetimeFigureOut">
               <a:rPr lang="en-US" smtClean="0"/>
               <a:pPr/>
-              <a:t>12/15/2022</a:t>
+              <a:t>12/16/2022</a:t>
             </a:fld>
             <a:endParaRPr lang="en-US"/>
           </a:p>
@@ -1644,7 +1898,7 @@
             <a:fld id="{53074F12-AA26-4AC8-9962-C36BB8F32554}" type="datetimeFigureOut">
               <a:rPr lang="en-US" smtClean="0"/>
               <a:pPr/>
-              <a:t>12/15/2022</a:t>
+              <a:t>12/16/2022</a:t>
             </a:fld>
             <a:endParaRPr lang="en-US"/>
           </a:p>
@@ -1814,7 +2068,7 @@
             <a:fld id="{53074F12-AA26-4AC8-9962-C36BB8F32554}" type="datetimeFigureOut">
               <a:rPr lang="en-US" smtClean="0"/>
               <a:pPr/>
-              <a:t>12/15/2022</a:t>
+              <a:t>12/16/2022</a:t>
             </a:fld>
             <a:endParaRPr lang="en-US"/>
           </a:p>
@@ -1994,7 +2248,7 @@
             <a:fld id="{53074F12-AA26-4AC8-9962-C36BB8F32554}" type="datetimeFigureOut">
               <a:rPr lang="en-US" smtClean="0"/>
               <a:pPr/>
-              <a:t>12/15/2022</a:t>
+              <a:t>12/16/2022</a:t>
             </a:fld>
             <a:endParaRPr lang="en-US"/>
           </a:p>
@@ -2278,7 +2532,7 @@
             <a:fld id="{53074F12-AA26-4AC8-9962-C36BB8F32554}" type="datetimeFigureOut">
               <a:rPr lang="en-US" smtClean="0"/>
               <a:pPr/>
-              <a:t>12/15/2022</a:t>
+              <a:t>12/16/2022</a:t>
             </a:fld>
             <a:endParaRPr lang="en-US"/>
           </a:p>
@@ -2534,7 +2788,7 @@
             <a:fld id="{53074F12-AA26-4AC8-9962-C36BB8F32554}" type="datetimeFigureOut">
               <a:rPr lang="en-US" smtClean="0"/>
               <a:pPr/>
-              <a:t>12/15/2022</a:t>
+              <a:t>12/16/2022</a:t>
             </a:fld>
             <a:endParaRPr lang="en-US"/>
           </a:p>
@@ -2781,7 +3035,7 @@
             <a:fld id="{53074F12-AA26-4AC8-9962-C36BB8F32554}" type="datetimeFigureOut">
               <a:rPr lang="en-US" smtClean="0"/>
               <a:pPr/>
-              <a:t>12/15/2022</a:t>
+              <a:t>12/16/2022</a:t>
             </a:fld>
             <a:endParaRPr lang="en-US"/>
           </a:p>
@@ -3068,7 +3322,7 @@
             <a:fld id="{53074F12-AA26-4AC8-9962-C36BB8F32554}" type="datetimeFigureOut">
               <a:rPr lang="en-US" smtClean="0"/>
               <a:pPr/>
-              <a:t>12/15/2022</a:t>
+              <a:t>12/16/2022</a:t>
             </a:fld>
             <a:endParaRPr lang="en-US"/>
           </a:p>
@@ -3558,7 +3812,7 @@
             <a:fld id="{53074F12-AA26-4AC8-9962-C36BB8F32554}" type="datetimeFigureOut">
               <a:rPr lang="en-US" smtClean="0"/>
               <a:pPr/>
-              <a:t>12/15/2022</a:t>
+              <a:t>12/16/2022</a:t>
             </a:fld>
             <a:endParaRPr lang="en-US"/>
           </a:p>
@@ -3677,7 +3931,7 @@
             <a:fld id="{53074F12-AA26-4AC8-9962-C36BB8F32554}" type="datetimeFigureOut">
               <a:rPr lang="en-US" smtClean="0"/>
               <a:pPr/>
-              <a:t>12/15/2022</a:t>
+              <a:t>12/16/2022</a:t>
             </a:fld>
             <a:endParaRPr lang="en-US"/>
           </a:p>
@@ -3774,7 +4028,7 @@
             <a:fld id="{53074F12-AA26-4AC8-9962-C36BB8F32554}" type="datetimeFigureOut">
               <a:rPr lang="en-US" smtClean="0"/>
               <a:pPr/>
-              <a:t>12/15/2022</a:t>
+              <a:t>12/16/2022</a:t>
             </a:fld>
             <a:endParaRPr lang="en-US"/>
           </a:p>
@@ -4051,7 +4305,7 @@
             <a:fld id="{53074F12-AA26-4AC8-9962-C36BB8F32554}" type="datetimeFigureOut">
               <a:rPr lang="en-US" smtClean="0"/>
               <a:pPr/>
-              <a:t>12/15/2022</a:t>
+              <a:t>12/16/2022</a:t>
             </a:fld>
             <a:endParaRPr lang="en-US"/>
           </a:p>
@@ -4278,7 +4532,7 @@
             <a:fld id="{53074F12-AA26-4AC8-9962-C36BB8F32554}" type="datetimeFigureOut">
               <a:rPr lang="en-US" smtClean="0"/>
               <a:pPr/>
-              <a:t>12/15/2022</a:t>
+              <a:t>12/16/2022</a:t>
             </a:fld>
             <a:endParaRPr lang="en-US"/>
           </a:p>
@@ -5091,6 +5345,176 @@
 </p:sld>
 </file>
 
+<file path=ppt/slides/slide10.xml><?xml version="1.0" encoding="utf-8"?>
+<p:sld xmlns:a="http://schemas.openxmlformats.org/drawingml/2006/main" xmlns:r="http://schemas.openxmlformats.org/officeDocument/2006/relationships" xmlns:p="http://schemas.openxmlformats.org/presentationml/2006/main">
+  <p:cSld>
+    <p:spTree>
+      <p:nvGrpSpPr>
+        <p:cNvPr id="1" name=""/>
+        <p:cNvGrpSpPr/>
+        <p:nvPr/>
+      </p:nvGrpSpPr>
+      <p:grpSpPr>
+        <a:xfrm>
+          <a:off x="0" y="0"/>
+          <a:ext cx="0" cy="0"/>
+          <a:chOff x="0" y="0"/>
+          <a:chExt cx="0" cy="0"/>
+        </a:xfrm>
+      </p:grpSpPr>
+      <p:sp>
+        <p:nvSpPr>
+          <p:cNvPr id="4" name="Title 3">
+            <a:extLst>
+              <a:ext uri="{FF2B5EF4-FFF2-40B4-BE49-F238E27FC236}">
+                <a16:creationId xmlns:a16="http://schemas.microsoft.com/office/drawing/2014/main" id="{BDE6CE25-34FB-4714-9DAA-1CEAE47154BE}"/>
+              </a:ext>
+            </a:extLst>
+          </p:cNvPr>
+          <p:cNvSpPr>
+            <a:spLocks noGrp="1"/>
+          </p:cNvSpPr>
+          <p:nvPr>
+            <p:ph type="title"/>
+          </p:nvPr>
+        </p:nvSpPr>
+        <p:spPr>
+          <a:xfrm>
+            <a:off x="659756" y="2416323"/>
+            <a:ext cx="8345486" cy="1021556"/>
+          </a:xfrm>
+        </p:spPr>
+        <p:txBody>
+          <a:bodyPr>
+            <a:normAutofit fontScale="90000"/>
+          </a:bodyPr>
+          <a:lstStyle/>
+          <a:p>
+            <a:r>
+              <a:rPr lang="en-US" dirty="0"/>
+              <a:t>Questions?</a:t>
+            </a:r>
+            <a:br>
+              <a:rPr lang="en-US" dirty="0"/>
+            </a:br>
+            <a:br>
+              <a:rPr lang="en-US" dirty="0"/>
+            </a:br>
+            <a:endParaRPr lang="en-US" dirty="0"/>
+          </a:p>
+        </p:txBody>
+      </p:sp>
+      <p:sp>
+        <p:nvSpPr>
+          <p:cNvPr id="8" name="Flowchart: Terminator 7">
+            <a:extLst>
+              <a:ext uri="{FF2B5EF4-FFF2-40B4-BE49-F238E27FC236}">
+                <a16:creationId xmlns:a16="http://schemas.microsoft.com/office/drawing/2014/main" id="{D5B6B643-3540-412D-93BD-BBF067F58B1B}"/>
+              </a:ext>
+            </a:extLst>
+          </p:cNvPr>
+          <p:cNvSpPr/>
+          <p:nvPr/>
+        </p:nvSpPr>
+        <p:spPr>
+          <a:xfrm>
+            <a:off x="7467600" y="4552950"/>
+            <a:ext cx="1103376" cy="228600"/>
+          </a:xfrm>
+          <a:prstGeom prst="flowChartTerminator">
+            <a:avLst/>
+          </a:prstGeom>
+          <a:solidFill>
+            <a:schemeClr val="accent3">
+              <a:lumMod val="20000"/>
+              <a:lumOff val="80000"/>
+            </a:schemeClr>
+          </a:solidFill>
+          <a:ln>
+            <a:solidFill>
+              <a:schemeClr val="accent3">
+                <a:lumMod val="60000"/>
+                <a:lumOff val="40000"/>
+              </a:schemeClr>
+            </a:solidFill>
+          </a:ln>
+        </p:spPr>
+        <p:style>
+          <a:lnRef idx="2">
+            <a:schemeClr val="accent1">
+              <a:shade val="50000"/>
+            </a:schemeClr>
+          </a:lnRef>
+          <a:fillRef idx="1">
+            <a:schemeClr val="accent1"/>
+          </a:fillRef>
+          <a:effectRef idx="0">
+            <a:schemeClr val="accent1"/>
+          </a:effectRef>
+          <a:fontRef idx="minor">
+            <a:schemeClr val="lt1"/>
+          </a:fontRef>
+        </p:style>
+        <p:txBody>
+          <a:bodyPr rtlCol="0" anchor="ctr"/>
+          <a:lstStyle/>
+          <a:p>
+            <a:pPr algn="ctr"/>
+            <a:r>
+              <a:rPr lang="en-US" sz="1000" dirty="0">
+                <a:solidFill>
+                  <a:schemeClr val="tx1"/>
+                </a:solidFill>
+                <a:hlinkClick r:id="rId3" action="ppaction://hlinksldjump"/>
+              </a:rPr>
+              <a:t>Back to Agenda</a:t>
+            </a:r>
+            <a:endParaRPr lang="en-US" sz="1000" dirty="0">
+              <a:solidFill>
+                <a:schemeClr val="tx1"/>
+              </a:solidFill>
+            </a:endParaRPr>
+          </a:p>
+        </p:txBody>
+      </p:sp>
+      <p:sp>
+        <p:nvSpPr>
+          <p:cNvPr id="3" name="Text Placeholder 2">
+            <a:extLst>
+              <a:ext uri="{FF2B5EF4-FFF2-40B4-BE49-F238E27FC236}">
+                <a16:creationId xmlns:a16="http://schemas.microsoft.com/office/drawing/2014/main" id="{361C4B50-1CAA-80A1-D4EE-BB07DE54319B}"/>
+              </a:ext>
+            </a:extLst>
+          </p:cNvPr>
+          <p:cNvSpPr>
+            <a:spLocks noGrp="1"/>
+          </p:cNvSpPr>
+          <p:nvPr>
+            <p:ph type="body" idx="1"/>
+          </p:nvPr>
+        </p:nvSpPr>
+        <p:spPr/>
+        <p:txBody>
+          <a:bodyPr/>
+          <a:lstStyle/>
+          <a:p>
+            <a:endParaRPr lang="en-US" dirty="0"/>
+          </a:p>
+        </p:txBody>
+      </p:sp>
+    </p:spTree>
+    <p:extLst>
+      <p:ext uri="{BB962C8B-B14F-4D97-AF65-F5344CB8AC3E}">
+        <p14:creationId xmlns:p14="http://schemas.microsoft.com/office/powerpoint/2010/main" val="2830109214"/>
+      </p:ext>
+    </p:extLst>
+  </p:cSld>
+  <p:clrMapOvr>
+    <a:masterClrMapping/>
+  </p:clrMapOvr>
+</p:sld>
+</file>
+
 <file path=ppt/slides/slide2.xml><?xml version="1.0" encoding="utf-8"?>
 <p:sld xmlns:a="http://schemas.openxmlformats.org/drawingml/2006/main" xmlns:r="http://schemas.openxmlformats.org/officeDocument/2006/relationships" xmlns:p="http://schemas.openxmlformats.org/presentationml/2006/main">
   <p:cSld>
@@ -5417,6 +5841,46 @@
             <a:pPr marL="0" indent="0">
               <a:buNone/>
             </a:pPr>
+            <a:r>
+              <a:rPr lang="en-US" dirty="0"/>
+              <a:t>Three sections to the presentation:</a:t>
+            </a:r>
+          </a:p>
+          <a:p>
+            <a:pPr marL="514350" indent="-514350">
+              <a:buAutoNum type="arabicParenR"/>
+            </a:pPr>
+            <a:r>
+              <a:rPr lang="en-US" dirty="0"/>
+              <a:t>A General Introduction and Problem Statement</a:t>
+            </a:r>
+          </a:p>
+          <a:p>
+            <a:pPr marL="514350" indent="-514350">
+              <a:buAutoNum type="arabicParenR"/>
+            </a:pPr>
+            <a:r>
+              <a:rPr lang="en-US" dirty="0" err="1"/>
+              <a:t>Meino’s</a:t>
+            </a:r>
+            <a:r>
+              <a:rPr lang="en-US" dirty="0"/>
+              <a:t> solution</a:t>
+            </a:r>
+          </a:p>
+          <a:p>
+            <a:pPr marL="514350" indent="-514350">
+              <a:buAutoNum type="arabicParenR"/>
+            </a:pPr>
+            <a:r>
+              <a:rPr lang="en-US" dirty="0"/>
+              <a:t>Alan’s solution </a:t>
+            </a:r>
+          </a:p>
+          <a:p>
+            <a:pPr marL="514350" indent="-514350">
+              <a:buAutoNum type="arabicParenR"/>
+            </a:pPr>
             <a:endParaRPr lang="en-US" dirty="0"/>
           </a:p>
         </p:txBody>
@@ -5523,8 +5987,8 @@
         </p:nvSpPr>
         <p:spPr>
           <a:xfrm>
-            <a:off x="448964" y="1350111"/>
-            <a:ext cx="8428335" cy="3417152"/>
+            <a:off x="304800" y="1347475"/>
+            <a:ext cx="5266036" cy="1910075"/>
           </a:xfrm>
         </p:spPr>
         <p:txBody>
@@ -5536,7 +6000,266 @@
             <a:pPr marL="0" indent="0">
               <a:buNone/>
             </a:pPr>
-            <a:endParaRPr lang="en-US" dirty="0"/>
+            <a:r>
+              <a:rPr lang="en-US" sz="2000" dirty="0"/>
+              <a:t>Controlling a turntable can be simple</a:t>
+            </a:r>
+          </a:p>
+          <a:p>
+            <a:pPr marL="339725" lvl="1" indent="-227013"/>
+            <a:r>
+              <a:rPr lang="en-US" sz="2000" dirty="0"/>
+              <a:t>It can also be not so simple</a:t>
+            </a:r>
+          </a:p>
+          <a:p>
+            <a:pPr marL="339725" lvl="1" indent="-227013"/>
+            <a:r>
+              <a:rPr lang="en-US" sz="2000" dirty="0"/>
+              <a:t>You don’t need an Arduino</a:t>
+            </a:r>
+          </a:p>
+          <a:p>
+            <a:pPr marL="339725" lvl="1" indent="-227013"/>
+            <a:r>
+              <a:rPr lang="en-US" sz="2000" dirty="0"/>
+              <a:t>And yes it can be done with Meccano and a hand crank</a:t>
+            </a:r>
+          </a:p>
+        </p:txBody>
+      </p:sp>
+      <p:pic>
+        <p:nvPicPr>
+          <p:cNvPr id="4" name="Picture 3">
+            <a:extLst>
+              <a:ext uri="{FF2B5EF4-FFF2-40B4-BE49-F238E27FC236}">
+                <a16:creationId xmlns:a16="http://schemas.microsoft.com/office/drawing/2014/main" id="{8CBCA567-7F2C-4256-9D8B-A87EC4D25AAB}"/>
+              </a:ext>
+            </a:extLst>
+          </p:cNvPr>
+          <p:cNvPicPr>
+            <a:picLocks noChangeAspect="1"/>
+          </p:cNvPicPr>
+          <p:nvPr/>
+        </p:nvPicPr>
+        <p:blipFill>
+          <a:blip r:embed="rId3" cstate="screen">
+            <a:extLst>
+              <a:ext uri="{28A0092B-C50C-407E-A947-70E740481C1C}">
+                <a14:useLocalDpi xmlns:a14="http://schemas.microsoft.com/office/drawing/2010/main"/>
+              </a:ext>
+            </a:extLst>
+          </a:blip>
+          <a:stretch>
+            <a:fillRect/>
+          </a:stretch>
+        </p:blipFill>
+        <p:spPr>
+          <a:xfrm>
+            <a:off x="7848600" y="4583336"/>
+            <a:ext cx="1028700" cy="457771"/>
+          </a:xfrm>
+          <a:prstGeom prst="rect">
+            <a:avLst/>
+          </a:prstGeom>
+        </p:spPr>
+      </p:pic>
+      <p:pic>
+        <p:nvPicPr>
+          <p:cNvPr id="8" name="Picture 7">
+            <a:extLst>
+              <a:ext uri="{FF2B5EF4-FFF2-40B4-BE49-F238E27FC236}">
+                <a16:creationId xmlns:a16="http://schemas.microsoft.com/office/drawing/2014/main" id="{ED49E67C-EF47-0BB5-A6C6-FC18702F757A}"/>
+              </a:ext>
+            </a:extLst>
+          </p:cNvPr>
+          <p:cNvPicPr>
+            <a:picLocks noChangeAspect="1"/>
+          </p:cNvPicPr>
+          <p:nvPr/>
+        </p:nvPicPr>
+        <p:blipFill>
+          <a:blip r:embed="rId4"/>
+          <a:stretch>
+            <a:fillRect/>
+          </a:stretch>
+        </p:blipFill>
+        <p:spPr>
+          <a:xfrm>
+            <a:off x="5486400" y="1276349"/>
+            <a:ext cx="2970757" cy="2228915"/>
+          </a:xfrm>
+          <a:prstGeom prst="rect">
+            <a:avLst/>
+          </a:prstGeom>
+        </p:spPr>
+      </p:pic>
+      <p:sp>
+        <p:nvSpPr>
+          <p:cNvPr id="10" name="TextBox 9">
+            <a:extLst>
+              <a:ext uri="{FF2B5EF4-FFF2-40B4-BE49-F238E27FC236}">
+                <a16:creationId xmlns:a16="http://schemas.microsoft.com/office/drawing/2014/main" id="{61DD2D9D-E7B5-7439-DAD1-2C55F1C618B1}"/>
+              </a:ext>
+            </a:extLst>
+          </p:cNvPr>
+          <p:cNvSpPr txBox="1"/>
+          <p:nvPr/>
+        </p:nvSpPr>
+        <p:spPr>
+          <a:xfrm>
+            <a:off x="459670" y="3938078"/>
+            <a:ext cx="8113558" cy="400110"/>
+          </a:xfrm>
+          <a:prstGeom prst="rect">
+            <a:avLst/>
+          </a:prstGeom>
+          <a:noFill/>
+        </p:spPr>
+        <p:txBody>
+          <a:bodyPr wrap="square">
+            <a:spAutoFit/>
+          </a:bodyPr>
+          <a:lstStyle/>
+          <a:p>
+            <a:pPr marL="0" indent="0">
+              <a:buNone/>
+            </a:pPr>
+            <a:r>
+              <a:rPr lang="en-US" sz="2000" dirty="0"/>
+              <a:t>Regardless of How there are some generic things that will need to happen ….</a:t>
+            </a:r>
+          </a:p>
+        </p:txBody>
+      </p:sp>
+    </p:spTree>
+    <p:extLst>
+      <p:ext uri="{BB962C8B-B14F-4D97-AF65-F5344CB8AC3E}">
+        <p14:creationId xmlns:p14="http://schemas.microsoft.com/office/powerpoint/2010/main" val="3345020425"/>
+      </p:ext>
+    </p:extLst>
+  </p:cSld>
+  <p:clrMapOvr>
+    <a:masterClrMapping/>
+  </p:clrMapOvr>
+</p:sld>
+</file>
+
+<file path=ppt/slides/slide5.xml><?xml version="1.0" encoding="utf-8"?>
+<p:sld xmlns:a="http://schemas.openxmlformats.org/drawingml/2006/main" xmlns:r="http://schemas.openxmlformats.org/officeDocument/2006/relationships" xmlns:p="http://schemas.openxmlformats.org/presentationml/2006/main">
+  <p:cSld>
+    <p:spTree>
+      <p:nvGrpSpPr>
+        <p:cNvPr id="1" name=""/>
+        <p:cNvGrpSpPr/>
+        <p:nvPr/>
+      </p:nvGrpSpPr>
+      <p:grpSpPr>
+        <a:xfrm>
+          <a:off x="0" y="0"/>
+          <a:ext cx="0" cy="0"/>
+          <a:chOff x="0" y="0"/>
+          <a:chExt cx="0" cy="0"/>
+        </a:xfrm>
+      </p:grpSpPr>
+      <p:sp>
+        <p:nvSpPr>
+          <p:cNvPr id="2" name="Title 1"/>
+          <p:cNvSpPr>
+            <a:spLocks noGrp="1"/>
+          </p:cNvSpPr>
+          <p:nvPr>
+            <p:ph type="title"/>
+          </p:nvPr>
+        </p:nvSpPr>
+        <p:spPr/>
+        <p:txBody>
+          <a:bodyPr>
+            <a:normAutofit/>
+          </a:bodyPr>
+          <a:lstStyle/>
+          <a:p>
+            <a:r>
+              <a:rPr lang="en-US" dirty="0"/>
+              <a:t>Details</a:t>
+            </a:r>
+          </a:p>
+        </p:txBody>
+      </p:sp>
+      <p:sp>
+        <p:nvSpPr>
+          <p:cNvPr id="3" name="Content Placeholder 2"/>
+          <p:cNvSpPr>
+            <a:spLocks noGrp="1"/>
+          </p:cNvSpPr>
+          <p:nvPr>
+            <p:ph idx="1"/>
+          </p:nvPr>
+        </p:nvSpPr>
+        <p:spPr>
+          <a:xfrm>
+            <a:off x="266700" y="1186808"/>
+            <a:ext cx="8610599" cy="3417152"/>
+          </a:xfrm>
+        </p:spPr>
+        <p:txBody>
+          <a:bodyPr>
+            <a:normAutofit fontScale="77500" lnSpcReduction="20000"/>
+          </a:bodyPr>
+          <a:lstStyle/>
+          <a:p>
+            <a:pPr marL="0" indent="0">
+              <a:buNone/>
+            </a:pPr>
+            <a:r>
+              <a:rPr lang="en-US" dirty="0"/>
+              <a:t>On a Turntable the part that moves is called the bridge, (the stationary part is the well).</a:t>
+            </a:r>
+          </a:p>
+          <a:p>
+            <a:pPr marL="0" indent="0">
+              <a:buNone/>
+            </a:pPr>
+            <a:r>
+              <a:rPr lang="en-US" dirty="0"/>
+              <a:t>Of course we need to know the required stop location(s) for the bridge. Normally a track is located there. This is the target position</a:t>
+            </a:r>
+          </a:p>
+          <a:p>
+            <a:pPr marL="0" indent="0">
+              <a:buNone/>
+            </a:pPr>
+            <a:r>
+              <a:rPr lang="en-US" dirty="0"/>
+              <a:t>As the bridge rotates we need to know are we at a stop position? This is awareness of the current bridge position.</a:t>
+            </a:r>
+          </a:p>
+          <a:p>
+            <a:pPr marL="0" indent="0">
+              <a:buNone/>
+            </a:pPr>
+            <a:r>
+              <a:rPr lang="en-US" dirty="0"/>
+              <a:t>Something (or someone) needs to coordinate the motion to close the gap causing the bridge to stop in the right place. The Logic!</a:t>
+            </a:r>
+          </a:p>
+          <a:p>
+            <a:pPr marL="0" indent="0">
+              <a:buNone/>
+            </a:pPr>
+            <a:r>
+              <a:rPr lang="en-US" dirty="0"/>
+              <a:t>None of this says ‘Arduino’ … it could still be fingers and eyeballs.</a:t>
+            </a:r>
+          </a:p>
+          <a:p>
+            <a:pPr marL="0" indent="0">
+              <a:buNone/>
+            </a:pPr>
+            <a:r>
+              <a:rPr lang="en-US" dirty="0"/>
+              <a:t>BUT If we assume Arduino then the following block diagram will apply.</a:t>
+            </a:r>
           </a:p>
         </p:txBody>
       </p:sp>
@@ -5579,17 +6302,542 @@
     </p:spTree>
     <p:extLst>
       <p:ext uri="{BB962C8B-B14F-4D97-AF65-F5344CB8AC3E}">
-        <p14:creationId xmlns:p14="http://schemas.microsoft.com/office/powerpoint/2010/main" val="3345020425"/>
+        <p14:creationId xmlns:p14="http://schemas.microsoft.com/office/powerpoint/2010/main" val="507977649"/>
       </p:ext>
     </p:extLst>
   </p:cSld>
   <p:clrMapOvr>
     <a:masterClrMapping/>
   </p:clrMapOvr>
+  <p:timing>
+    <p:tnLst>
+      <p:par>
+        <p:cTn id="1" dur="indefinite" restart="never" nodeType="tmRoot">
+          <p:childTnLst>
+            <p:seq concurrent="1" nextAc="seek">
+              <p:cTn id="2" dur="indefinite" nodeType="mainSeq">
+                <p:childTnLst>
+                  <p:par>
+                    <p:cTn id="3" fill="hold">
+                      <p:stCondLst>
+                        <p:cond delay="indefinite"/>
+                      </p:stCondLst>
+                      <p:childTnLst>
+                        <p:par>
+                          <p:cTn id="4" fill="hold">
+                            <p:stCondLst>
+                              <p:cond delay="0"/>
+                            </p:stCondLst>
+                            <p:childTnLst>
+                              <p:par>
+                                <p:cTn id="5" presetID="10" presetClass="entr" presetSubtype="0" fill="hold" nodeType="clickEffect">
+                                  <p:stCondLst>
+                                    <p:cond delay="0"/>
+                                  </p:stCondLst>
+                                  <p:childTnLst>
+                                    <p:set>
+                                      <p:cBhvr>
+                                        <p:cTn id="6" dur="1" fill="hold">
+                                          <p:stCondLst>
+                                            <p:cond delay="0"/>
+                                          </p:stCondLst>
+                                        </p:cTn>
+                                        <p:tgtEl>
+                                          <p:spTgt spid="3">
+                                            <p:txEl>
+                                              <p:pRg st="1" end="1"/>
+                                            </p:txEl>
+                                          </p:spTgt>
+                                        </p:tgtEl>
+                                        <p:attrNameLst>
+                                          <p:attrName>style.visibility</p:attrName>
+                                        </p:attrNameLst>
+                                      </p:cBhvr>
+                                      <p:to>
+                                        <p:strVal val="visible"/>
+                                      </p:to>
+                                    </p:set>
+                                    <p:animEffect transition="in" filter="fade">
+                                      <p:cBhvr>
+                                        <p:cTn id="7" dur="500"/>
+                                        <p:tgtEl>
+                                          <p:spTgt spid="3">
+                                            <p:txEl>
+                                              <p:pRg st="1" end="1"/>
+                                            </p:txEl>
+                                          </p:spTgt>
+                                        </p:tgtEl>
+                                      </p:cBhvr>
+                                    </p:animEffect>
+                                  </p:childTnLst>
+                                </p:cTn>
+                              </p:par>
+                            </p:childTnLst>
+                          </p:cTn>
+                        </p:par>
+                        <p:par>
+                          <p:cTn id="8" fill="hold">
+                            <p:stCondLst>
+                              <p:cond delay="500"/>
+                            </p:stCondLst>
+                            <p:childTnLst>
+                              <p:par>
+                                <p:cTn id="9" presetID="10" presetClass="exit" presetSubtype="0" fill="hold" nodeType="afterEffect">
+                                  <p:stCondLst>
+                                    <p:cond delay="0"/>
+                                  </p:stCondLst>
+                                  <p:childTnLst>
+                                    <p:animEffect transition="out" filter="fade">
+                                      <p:cBhvr>
+                                        <p:cTn id="10" dur="500"/>
+                                        <p:tgtEl>
+                                          <p:spTgt spid="3">
+                                            <p:txEl>
+                                              <p:pRg st="0" end="0"/>
+                                            </p:txEl>
+                                          </p:spTgt>
+                                        </p:tgtEl>
+                                      </p:cBhvr>
+                                    </p:animEffect>
+                                    <p:set>
+                                      <p:cBhvr>
+                                        <p:cTn id="11" dur="1" fill="hold">
+                                          <p:stCondLst>
+                                            <p:cond delay="499"/>
+                                          </p:stCondLst>
+                                        </p:cTn>
+                                        <p:tgtEl>
+                                          <p:spTgt spid="3">
+                                            <p:txEl>
+                                              <p:pRg st="0" end="0"/>
+                                            </p:txEl>
+                                          </p:spTgt>
+                                        </p:tgtEl>
+                                        <p:attrNameLst>
+                                          <p:attrName>style.visibility</p:attrName>
+                                        </p:attrNameLst>
+                                      </p:cBhvr>
+                                      <p:to>
+                                        <p:strVal val="hidden"/>
+                                      </p:to>
+                                    </p:set>
+                                  </p:childTnLst>
+                                </p:cTn>
+                              </p:par>
+                            </p:childTnLst>
+                          </p:cTn>
+                        </p:par>
+                      </p:childTnLst>
+                    </p:cTn>
+                  </p:par>
+                  <p:par>
+                    <p:cTn id="12" fill="hold">
+                      <p:stCondLst>
+                        <p:cond delay="indefinite"/>
+                      </p:stCondLst>
+                      <p:childTnLst>
+                        <p:par>
+                          <p:cTn id="13" fill="hold">
+                            <p:stCondLst>
+                              <p:cond delay="0"/>
+                            </p:stCondLst>
+                            <p:childTnLst>
+                              <p:par>
+                                <p:cTn id="14" presetID="10" presetClass="entr" presetSubtype="0" fill="hold" nodeType="clickEffect">
+                                  <p:stCondLst>
+                                    <p:cond delay="0"/>
+                                  </p:stCondLst>
+                                  <p:childTnLst>
+                                    <p:set>
+                                      <p:cBhvr>
+                                        <p:cTn id="15" dur="1" fill="hold">
+                                          <p:stCondLst>
+                                            <p:cond delay="0"/>
+                                          </p:stCondLst>
+                                        </p:cTn>
+                                        <p:tgtEl>
+                                          <p:spTgt spid="3">
+                                            <p:txEl>
+                                              <p:pRg st="2" end="2"/>
+                                            </p:txEl>
+                                          </p:spTgt>
+                                        </p:tgtEl>
+                                        <p:attrNameLst>
+                                          <p:attrName>style.visibility</p:attrName>
+                                        </p:attrNameLst>
+                                      </p:cBhvr>
+                                      <p:to>
+                                        <p:strVal val="visible"/>
+                                      </p:to>
+                                    </p:set>
+                                    <p:animEffect transition="in" filter="fade">
+                                      <p:cBhvr>
+                                        <p:cTn id="16" dur="500"/>
+                                        <p:tgtEl>
+                                          <p:spTgt spid="3">
+                                            <p:txEl>
+                                              <p:pRg st="2" end="2"/>
+                                            </p:txEl>
+                                          </p:spTgt>
+                                        </p:tgtEl>
+                                      </p:cBhvr>
+                                    </p:animEffect>
+                                  </p:childTnLst>
+                                </p:cTn>
+                              </p:par>
+                            </p:childTnLst>
+                          </p:cTn>
+                        </p:par>
+                        <p:par>
+                          <p:cTn id="17" fill="hold">
+                            <p:stCondLst>
+                              <p:cond delay="500"/>
+                            </p:stCondLst>
+                            <p:childTnLst>
+                              <p:par>
+                                <p:cTn id="18" presetID="10" presetClass="exit" presetSubtype="0" fill="hold" nodeType="afterEffect">
+                                  <p:stCondLst>
+                                    <p:cond delay="0"/>
+                                  </p:stCondLst>
+                                  <p:childTnLst>
+                                    <p:animEffect transition="out" filter="fade">
+                                      <p:cBhvr>
+                                        <p:cTn id="19" dur="500"/>
+                                        <p:tgtEl>
+                                          <p:spTgt spid="3">
+                                            <p:txEl>
+                                              <p:pRg st="1" end="1"/>
+                                            </p:txEl>
+                                          </p:spTgt>
+                                        </p:tgtEl>
+                                      </p:cBhvr>
+                                    </p:animEffect>
+                                    <p:set>
+                                      <p:cBhvr>
+                                        <p:cTn id="20" dur="1" fill="hold">
+                                          <p:stCondLst>
+                                            <p:cond delay="499"/>
+                                          </p:stCondLst>
+                                        </p:cTn>
+                                        <p:tgtEl>
+                                          <p:spTgt spid="3">
+                                            <p:txEl>
+                                              <p:pRg st="1" end="1"/>
+                                            </p:txEl>
+                                          </p:spTgt>
+                                        </p:tgtEl>
+                                        <p:attrNameLst>
+                                          <p:attrName>style.visibility</p:attrName>
+                                        </p:attrNameLst>
+                                      </p:cBhvr>
+                                      <p:to>
+                                        <p:strVal val="hidden"/>
+                                      </p:to>
+                                    </p:set>
+                                  </p:childTnLst>
+                                </p:cTn>
+                              </p:par>
+                            </p:childTnLst>
+                          </p:cTn>
+                        </p:par>
+                      </p:childTnLst>
+                    </p:cTn>
+                  </p:par>
+                  <p:par>
+                    <p:cTn id="21" fill="hold">
+                      <p:stCondLst>
+                        <p:cond delay="indefinite"/>
+                      </p:stCondLst>
+                      <p:childTnLst>
+                        <p:par>
+                          <p:cTn id="22" fill="hold">
+                            <p:stCondLst>
+                              <p:cond delay="0"/>
+                            </p:stCondLst>
+                            <p:childTnLst>
+                              <p:par>
+                                <p:cTn id="23" presetID="10" presetClass="entr" presetSubtype="0" fill="hold" nodeType="clickEffect">
+                                  <p:stCondLst>
+                                    <p:cond delay="0"/>
+                                  </p:stCondLst>
+                                  <p:childTnLst>
+                                    <p:set>
+                                      <p:cBhvr>
+                                        <p:cTn id="24" dur="1" fill="hold">
+                                          <p:stCondLst>
+                                            <p:cond delay="0"/>
+                                          </p:stCondLst>
+                                        </p:cTn>
+                                        <p:tgtEl>
+                                          <p:spTgt spid="3">
+                                            <p:txEl>
+                                              <p:pRg st="3" end="3"/>
+                                            </p:txEl>
+                                          </p:spTgt>
+                                        </p:tgtEl>
+                                        <p:attrNameLst>
+                                          <p:attrName>style.visibility</p:attrName>
+                                        </p:attrNameLst>
+                                      </p:cBhvr>
+                                      <p:to>
+                                        <p:strVal val="visible"/>
+                                      </p:to>
+                                    </p:set>
+                                    <p:animEffect transition="in" filter="fade">
+                                      <p:cBhvr>
+                                        <p:cTn id="25" dur="500"/>
+                                        <p:tgtEl>
+                                          <p:spTgt spid="3">
+                                            <p:txEl>
+                                              <p:pRg st="3" end="3"/>
+                                            </p:txEl>
+                                          </p:spTgt>
+                                        </p:tgtEl>
+                                      </p:cBhvr>
+                                    </p:animEffect>
+                                  </p:childTnLst>
+                                </p:cTn>
+                              </p:par>
+                            </p:childTnLst>
+                          </p:cTn>
+                        </p:par>
+                        <p:par>
+                          <p:cTn id="26" fill="hold">
+                            <p:stCondLst>
+                              <p:cond delay="500"/>
+                            </p:stCondLst>
+                            <p:childTnLst>
+                              <p:par>
+                                <p:cTn id="27" presetID="10" presetClass="exit" presetSubtype="0" fill="hold" nodeType="afterEffect">
+                                  <p:stCondLst>
+                                    <p:cond delay="0"/>
+                                  </p:stCondLst>
+                                  <p:childTnLst>
+                                    <p:animEffect transition="out" filter="fade">
+                                      <p:cBhvr>
+                                        <p:cTn id="28" dur="500"/>
+                                        <p:tgtEl>
+                                          <p:spTgt spid="3">
+                                            <p:txEl>
+                                              <p:pRg st="2" end="2"/>
+                                            </p:txEl>
+                                          </p:spTgt>
+                                        </p:tgtEl>
+                                      </p:cBhvr>
+                                    </p:animEffect>
+                                    <p:set>
+                                      <p:cBhvr>
+                                        <p:cTn id="29" dur="1" fill="hold">
+                                          <p:stCondLst>
+                                            <p:cond delay="499"/>
+                                          </p:stCondLst>
+                                        </p:cTn>
+                                        <p:tgtEl>
+                                          <p:spTgt spid="3">
+                                            <p:txEl>
+                                              <p:pRg st="2" end="2"/>
+                                            </p:txEl>
+                                          </p:spTgt>
+                                        </p:tgtEl>
+                                        <p:attrNameLst>
+                                          <p:attrName>style.visibility</p:attrName>
+                                        </p:attrNameLst>
+                                      </p:cBhvr>
+                                      <p:to>
+                                        <p:strVal val="hidden"/>
+                                      </p:to>
+                                    </p:set>
+                                  </p:childTnLst>
+                                </p:cTn>
+                              </p:par>
+                            </p:childTnLst>
+                          </p:cTn>
+                        </p:par>
+                      </p:childTnLst>
+                    </p:cTn>
+                  </p:par>
+                  <p:par>
+                    <p:cTn id="30" fill="hold">
+                      <p:stCondLst>
+                        <p:cond delay="indefinite"/>
+                      </p:stCondLst>
+                      <p:childTnLst>
+                        <p:par>
+                          <p:cTn id="31" fill="hold">
+                            <p:stCondLst>
+                              <p:cond delay="0"/>
+                            </p:stCondLst>
+                            <p:childTnLst>
+                              <p:par>
+                                <p:cTn id="32" presetID="10" presetClass="entr" presetSubtype="0" fill="hold" nodeType="clickEffect">
+                                  <p:stCondLst>
+                                    <p:cond delay="0"/>
+                                  </p:stCondLst>
+                                  <p:childTnLst>
+                                    <p:set>
+                                      <p:cBhvr>
+                                        <p:cTn id="33" dur="1" fill="hold">
+                                          <p:stCondLst>
+                                            <p:cond delay="0"/>
+                                          </p:stCondLst>
+                                        </p:cTn>
+                                        <p:tgtEl>
+                                          <p:spTgt spid="3">
+                                            <p:txEl>
+                                              <p:pRg st="4" end="4"/>
+                                            </p:txEl>
+                                          </p:spTgt>
+                                        </p:tgtEl>
+                                        <p:attrNameLst>
+                                          <p:attrName>style.visibility</p:attrName>
+                                        </p:attrNameLst>
+                                      </p:cBhvr>
+                                      <p:to>
+                                        <p:strVal val="visible"/>
+                                      </p:to>
+                                    </p:set>
+                                    <p:animEffect transition="in" filter="fade">
+                                      <p:cBhvr>
+                                        <p:cTn id="34" dur="500"/>
+                                        <p:tgtEl>
+                                          <p:spTgt spid="3">
+                                            <p:txEl>
+                                              <p:pRg st="4" end="4"/>
+                                            </p:txEl>
+                                          </p:spTgt>
+                                        </p:tgtEl>
+                                      </p:cBhvr>
+                                    </p:animEffect>
+                                  </p:childTnLst>
+                                </p:cTn>
+                              </p:par>
+                              <p:par>
+                                <p:cTn id="35" presetID="10" presetClass="entr" presetSubtype="0" fill="hold" nodeType="withEffect">
+                                  <p:stCondLst>
+                                    <p:cond delay="0"/>
+                                  </p:stCondLst>
+                                  <p:childTnLst>
+                                    <p:set>
+                                      <p:cBhvr>
+                                        <p:cTn id="36" dur="1" fill="hold">
+                                          <p:stCondLst>
+                                            <p:cond delay="0"/>
+                                          </p:stCondLst>
+                                        </p:cTn>
+                                        <p:tgtEl>
+                                          <p:spTgt spid="3">
+                                            <p:txEl>
+                                              <p:pRg st="5" end="5"/>
+                                            </p:txEl>
+                                          </p:spTgt>
+                                        </p:tgtEl>
+                                        <p:attrNameLst>
+                                          <p:attrName>style.visibility</p:attrName>
+                                        </p:attrNameLst>
+                                      </p:cBhvr>
+                                      <p:to>
+                                        <p:strVal val="visible"/>
+                                      </p:to>
+                                    </p:set>
+                                    <p:animEffect transition="in" filter="fade">
+                                      <p:cBhvr>
+                                        <p:cTn id="37" dur="500"/>
+                                        <p:tgtEl>
+                                          <p:spTgt spid="3">
+                                            <p:txEl>
+                                              <p:pRg st="5" end="5"/>
+                                            </p:txEl>
+                                          </p:spTgt>
+                                        </p:tgtEl>
+                                      </p:cBhvr>
+                                    </p:animEffect>
+                                  </p:childTnLst>
+                                </p:cTn>
+                              </p:par>
+                            </p:childTnLst>
+                          </p:cTn>
+                        </p:par>
+                        <p:par>
+                          <p:cTn id="38" fill="hold">
+                            <p:stCondLst>
+                              <p:cond delay="500"/>
+                            </p:stCondLst>
+                            <p:childTnLst>
+                              <p:par>
+                                <p:cTn id="39" presetID="10" presetClass="exit" presetSubtype="0" fill="hold" nodeType="afterEffect">
+                                  <p:stCondLst>
+                                    <p:cond delay="0"/>
+                                  </p:stCondLst>
+                                  <p:childTnLst>
+                                    <p:animEffect transition="out" filter="fade">
+                                      <p:cBhvr>
+                                        <p:cTn id="40" dur="500"/>
+                                        <p:tgtEl>
+                                          <p:spTgt spid="3">
+                                            <p:txEl>
+                                              <p:pRg st="3" end="3"/>
+                                            </p:txEl>
+                                          </p:spTgt>
+                                        </p:tgtEl>
+                                      </p:cBhvr>
+                                    </p:animEffect>
+                                    <p:set>
+                                      <p:cBhvr>
+                                        <p:cTn id="41" dur="1" fill="hold">
+                                          <p:stCondLst>
+                                            <p:cond delay="499"/>
+                                          </p:stCondLst>
+                                        </p:cTn>
+                                        <p:tgtEl>
+                                          <p:spTgt spid="3">
+                                            <p:txEl>
+                                              <p:pRg st="3" end="3"/>
+                                            </p:txEl>
+                                          </p:spTgt>
+                                        </p:tgtEl>
+                                        <p:attrNameLst>
+                                          <p:attrName>style.visibility</p:attrName>
+                                        </p:attrNameLst>
+                                      </p:cBhvr>
+                                      <p:to>
+                                        <p:strVal val="hidden"/>
+                                      </p:to>
+                                    </p:set>
+                                  </p:childTnLst>
+                                </p:cTn>
+                              </p:par>
+                            </p:childTnLst>
+                          </p:cTn>
+                        </p:par>
+                      </p:childTnLst>
+                    </p:cTn>
+                  </p:par>
+                </p:childTnLst>
+              </p:cTn>
+              <p:prevCondLst>
+                <p:cond evt="onPrev" delay="0">
+                  <p:tgtEl>
+                    <p:sldTgt/>
+                  </p:tgtEl>
+                </p:cond>
+              </p:prevCondLst>
+              <p:nextCondLst>
+                <p:cond evt="onNext" delay="0">
+                  <p:tgtEl>
+                    <p:sldTgt/>
+                  </p:tgtEl>
+                </p:cond>
+              </p:nextCondLst>
+            </p:seq>
+          </p:childTnLst>
+        </p:cTn>
+      </p:par>
+    </p:tnLst>
+  </p:timing>
 </p:sld>
 </file>
 
-<file path=ppt/slides/slide5.xml><?xml version="1.0" encoding="utf-8"?>
+<file path=ppt/slides/slide6.xml><?xml version="1.0" encoding="utf-8"?>
 <p:sld xmlns:a="http://schemas.openxmlformats.org/drawingml/2006/main" xmlns:r="http://schemas.openxmlformats.org/officeDocument/2006/relationships" xmlns:p="http://schemas.openxmlformats.org/presentationml/2006/main">
   <p:cSld>
     <p:spTree>
@@ -5606,6 +6854,142 @@
           <a:chExt cx="0" cy="0"/>
         </a:xfrm>
       </p:grpSpPr>
+      <p:grpSp>
+        <p:nvGrpSpPr>
+          <p:cNvPr id="78" name="Group 77">
+            <a:extLst>
+              <a:ext uri="{FF2B5EF4-FFF2-40B4-BE49-F238E27FC236}">
+                <a16:creationId xmlns:a16="http://schemas.microsoft.com/office/drawing/2014/main" id="{870ED598-7814-0C72-3147-5E25BE57A73F}"/>
+              </a:ext>
+            </a:extLst>
+          </p:cNvPr>
+          <p:cNvGrpSpPr/>
+          <p:nvPr/>
+        </p:nvGrpSpPr>
+        <p:grpSpPr>
+          <a:xfrm>
+            <a:off x="3276600" y="2902955"/>
+            <a:ext cx="3642920" cy="493149"/>
+            <a:chOff x="3276600" y="2902955"/>
+            <a:chExt cx="3642920" cy="493149"/>
+          </a:xfrm>
+        </p:grpSpPr>
+        <p:sp>
+          <p:nvSpPr>
+            <p:cNvPr id="15" name="Plaque 14">
+              <a:extLst>
+                <a:ext uri="{FF2B5EF4-FFF2-40B4-BE49-F238E27FC236}">
+                  <a16:creationId xmlns:a16="http://schemas.microsoft.com/office/drawing/2014/main" id="{8EFB2380-C563-7689-ED77-5F983C566D1D}"/>
+                </a:ext>
+              </a:extLst>
+            </p:cNvPr>
+            <p:cNvSpPr/>
+            <p:nvPr/>
+          </p:nvSpPr>
+          <p:spPr>
+            <a:xfrm>
+              <a:off x="3313755" y="2968028"/>
+              <a:ext cx="3573365" cy="188753"/>
+            </a:xfrm>
+            <a:prstGeom prst="plaque">
+              <a:avLst/>
+            </a:prstGeom>
+            <a:solidFill>
+              <a:schemeClr val="bg1">
+                <a:lumMod val="65000"/>
+              </a:schemeClr>
+            </a:solidFill>
+          </p:spPr>
+          <p:style>
+            <a:lnRef idx="2">
+              <a:schemeClr val="accent1">
+                <a:shade val="50000"/>
+              </a:schemeClr>
+            </a:lnRef>
+            <a:fillRef idx="1">
+              <a:schemeClr val="accent1"/>
+            </a:fillRef>
+            <a:effectRef idx="0">
+              <a:schemeClr val="accent1"/>
+            </a:effectRef>
+            <a:fontRef idx="minor">
+              <a:schemeClr val="lt1"/>
+            </a:fontRef>
+          </p:style>
+          <p:txBody>
+            <a:bodyPr rtlCol="0" anchor="ctr"/>
+            <a:lstStyle/>
+            <a:p>
+              <a:pPr algn="ctr" defTabSz="685800"/>
+              <a:endParaRPr lang="en-US" sz="1350">
+                <a:solidFill>
+                  <a:prstClr val="white"/>
+                </a:solidFill>
+                <a:latin typeface="Calibri" panose="020F0502020204030204"/>
+              </a:endParaRPr>
+            </a:p>
+          </p:txBody>
+        </p:sp>
+        <p:sp>
+          <p:nvSpPr>
+            <p:cNvPr id="18" name="Cylinder 17">
+              <a:extLst>
+                <a:ext uri="{FF2B5EF4-FFF2-40B4-BE49-F238E27FC236}">
+                  <a16:creationId xmlns:a16="http://schemas.microsoft.com/office/drawing/2014/main" id="{7AF48A10-99B4-0B9F-B0CC-32F8D5C0CC1F}"/>
+                </a:ext>
+              </a:extLst>
+            </p:cNvPr>
+            <p:cNvSpPr/>
+            <p:nvPr/>
+          </p:nvSpPr>
+          <p:spPr>
+            <a:xfrm>
+              <a:off x="3276600" y="2902955"/>
+              <a:ext cx="3642920" cy="493149"/>
+            </a:xfrm>
+            <a:prstGeom prst="can">
+              <a:avLst/>
+            </a:prstGeom>
+            <a:solidFill>
+              <a:schemeClr val="accent1">
+                <a:alpha val="25000"/>
+              </a:schemeClr>
+            </a:solidFill>
+          </p:spPr>
+          <p:style>
+            <a:lnRef idx="2">
+              <a:schemeClr val="accent1">
+                <a:shade val="50000"/>
+              </a:schemeClr>
+            </a:lnRef>
+            <a:fillRef idx="1">
+              <a:schemeClr val="accent1"/>
+            </a:fillRef>
+            <a:effectRef idx="0">
+              <a:schemeClr val="accent1"/>
+            </a:effectRef>
+            <a:fontRef idx="minor">
+              <a:schemeClr val="lt1"/>
+            </a:fontRef>
+          </p:style>
+          <p:txBody>
+            <a:bodyPr rtlCol="0" anchor="ctr"/>
+            <a:lstStyle/>
+            <a:p>
+              <a:pPr algn="ctr" defTabSz="685800"/>
+              <a:r>
+                <a:rPr lang="en-US" sz="1350" dirty="0">
+                  <a:solidFill>
+                    <a:prstClr val="white"/>
+                  </a:solidFill>
+                  <a:latin typeface="Calibri" panose="020F0502020204030204"/>
+                </a:rPr>
+                <a:t>Turntable</a:t>
+              </a:r>
+            </a:p>
+          </p:txBody>
+        </p:sp>
+      </p:grpSp>
       <p:sp>
         <p:nvSpPr>
           <p:cNvPr id="2" name="Title 1"/>
@@ -5633,37 +7017,8 @@
                   <a:srgbClr val="FFFF00"/>
                 </a:solidFill>
               </a:rPr>
-              <a:t>Block Diagram Here</a:t>
-            </a:r>
-          </a:p>
-        </p:txBody>
-      </p:sp>
-      <p:sp>
-        <p:nvSpPr>
-          <p:cNvPr id="3" name="Content Placeholder 2"/>
-          <p:cNvSpPr>
-            <a:spLocks noGrp="1"/>
-          </p:cNvSpPr>
-          <p:nvPr>
-            <p:ph idx="1"/>
-          </p:nvPr>
-        </p:nvSpPr>
-        <p:spPr>
-          <a:xfrm>
-            <a:off x="448964" y="1350111"/>
-            <a:ext cx="8428335" cy="3417152"/>
-          </a:xfrm>
-        </p:spPr>
-        <p:txBody>
-          <a:bodyPr>
-            <a:normAutofit/>
-          </a:bodyPr>
-          <a:lstStyle/>
-          <a:p>
-            <a:pPr marL="0" indent="0">
-              <a:buNone/>
-            </a:pPr>
-            <a:endParaRPr lang="en-US" dirty="0"/>
+              <a:t>Block Diagram</a:t>
+            </a:r>
           </a:p>
         </p:txBody>
       </p:sp>
@@ -5703,6 +7058,843 @@
           </a:prstGeom>
         </p:spPr>
       </p:pic>
+      <p:pic>
+        <p:nvPicPr>
+          <p:cNvPr id="6" name="Picture 5">
+            <a:extLst>
+              <a:ext uri="{FF2B5EF4-FFF2-40B4-BE49-F238E27FC236}">
+                <a16:creationId xmlns:a16="http://schemas.microsoft.com/office/drawing/2014/main" id="{C7A20977-78E1-D9E1-75FF-05CE0AF384F3}"/>
+              </a:ext>
+            </a:extLst>
+          </p:cNvPr>
+          <p:cNvPicPr>
+            <a:picLocks noChangeAspect="1"/>
+          </p:cNvPicPr>
+          <p:nvPr/>
+        </p:nvPicPr>
+        <p:blipFill>
+          <a:blip r:embed="rId4" cstate="print">
+            <a:extLst>
+              <a:ext uri="{28A0092B-C50C-407E-A947-70E740481C1C}">
+                <a14:useLocalDpi xmlns:a14="http://schemas.microsoft.com/office/drawing/2010/main"/>
+              </a:ext>
+            </a:extLst>
+          </a:blip>
+          <a:stretch>
+            <a:fillRect/>
+          </a:stretch>
+        </p:blipFill>
+        <p:spPr>
+          <a:xfrm>
+            <a:off x="3754961" y="2407652"/>
+            <a:ext cx="2689919" cy="545974"/>
+          </a:xfrm>
+          <a:prstGeom prst="rect">
+            <a:avLst/>
+          </a:prstGeom>
+        </p:spPr>
+      </p:pic>
+      <p:sp>
+        <p:nvSpPr>
+          <p:cNvPr id="11" name="Oval 10">
+            <a:extLst>
+              <a:ext uri="{FF2B5EF4-FFF2-40B4-BE49-F238E27FC236}">
+                <a16:creationId xmlns:a16="http://schemas.microsoft.com/office/drawing/2014/main" id="{FAF57F8F-F9B4-3C76-8306-6E38B74B98CD}"/>
+              </a:ext>
+            </a:extLst>
+          </p:cNvPr>
+          <p:cNvSpPr/>
+          <p:nvPr/>
+        </p:nvSpPr>
+        <p:spPr>
+          <a:xfrm>
+            <a:off x="4642032" y="3397634"/>
+            <a:ext cx="748718" cy="692092"/>
+          </a:xfrm>
+          <a:prstGeom prst="ellipse">
+            <a:avLst/>
+          </a:prstGeom>
+        </p:spPr>
+        <p:style>
+          <a:lnRef idx="2">
+            <a:schemeClr val="accent1">
+              <a:shade val="50000"/>
+            </a:schemeClr>
+          </a:lnRef>
+          <a:fillRef idx="1">
+            <a:schemeClr val="accent1"/>
+          </a:fillRef>
+          <a:effectRef idx="0">
+            <a:schemeClr val="accent1"/>
+          </a:effectRef>
+          <a:fontRef idx="minor">
+            <a:schemeClr val="lt1"/>
+          </a:fontRef>
+        </p:style>
+        <p:txBody>
+          <a:bodyPr rtlCol="0" anchor="ctr"/>
+          <a:lstStyle/>
+          <a:p>
+            <a:pPr algn="ctr" defTabSz="685800"/>
+            <a:r>
+              <a:rPr lang="en-US" sz="900" dirty="0">
+                <a:solidFill>
+                  <a:prstClr val="white"/>
+                </a:solidFill>
+                <a:latin typeface="Calibri" panose="020F0502020204030204"/>
+              </a:rPr>
+              <a:t>Motor</a:t>
+            </a:r>
+          </a:p>
+        </p:txBody>
+      </p:sp>
+      <p:sp>
+        <p:nvSpPr>
+          <p:cNvPr id="12" name="Hexagon 11">
+            <a:extLst>
+              <a:ext uri="{FF2B5EF4-FFF2-40B4-BE49-F238E27FC236}">
+                <a16:creationId xmlns:a16="http://schemas.microsoft.com/office/drawing/2014/main" id="{6F46F831-9F4A-7B81-1978-90DC52DE5128}"/>
+              </a:ext>
+            </a:extLst>
+          </p:cNvPr>
+          <p:cNvSpPr/>
+          <p:nvPr/>
+        </p:nvSpPr>
+        <p:spPr>
+          <a:xfrm>
+            <a:off x="2410397" y="3027204"/>
+            <a:ext cx="833400" cy="401870"/>
+          </a:xfrm>
+          <a:prstGeom prst="hexagon">
+            <a:avLst/>
+          </a:prstGeom>
+          <a:solidFill>
+            <a:schemeClr val="tx1"/>
+          </a:solidFill>
+        </p:spPr>
+        <p:style>
+          <a:lnRef idx="2">
+            <a:schemeClr val="accent1">
+              <a:shade val="50000"/>
+            </a:schemeClr>
+          </a:lnRef>
+          <a:fillRef idx="1">
+            <a:schemeClr val="accent1"/>
+          </a:fillRef>
+          <a:effectRef idx="0">
+            <a:schemeClr val="accent1"/>
+          </a:effectRef>
+          <a:fontRef idx="minor">
+            <a:schemeClr val="lt1"/>
+          </a:fontRef>
+        </p:style>
+        <p:txBody>
+          <a:bodyPr rtlCol="0" anchor="ctr"/>
+          <a:lstStyle/>
+          <a:p>
+            <a:pPr algn="ctr" defTabSz="685800"/>
+            <a:r>
+              <a:rPr lang="en-US" sz="1000" dirty="0" err="1">
+                <a:solidFill>
+                  <a:srgbClr val="FFFF00"/>
+                </a:solidFill>
+                <a:latin typeface="Calibri" panose="020F0502020204030204"/>
+              </a:rPr>
+              <a:t>PositionSENSOR</a:t>
+            </a:r>
+            <a:endParaRPr lang="en-US" sz="1000" dirty="0">
+              <a:solidFill>
+                <a:srgbClr val="FFFF00"/>
+              </a:solidFill>
+              <a:latin typeface="Calibri" panose="020F0502020204030204"/>
+            </a:endParaRPr>
+          </a:p>
+        </p:txBody>
+      </p:sp>
+      <p:sp>
+        <p:nvSpPr>
+          <p:cNvPr id="41" name="Rectangle 40">
+            <a:extLst>
+              <a:ext uri="{FF2B5EF4-FFF2-40B4-BE49-F238E27FC236}">
+                <a16:creationId xmlns:a16="http://schemas.microsoft.com/office/drawing/2014/main" id="{64F30375-7D19-F90C-58A3-22AA5C895AD3}"/>
+              </a:ext>
+            </a:extLst>
+          </p:cNvPr>
+          <p:cNvSpPr/>
+          <p:nvPr/>
+        </p:nvSpPr>
+        <p:spPr>
+          <a:xfrm>
+            <a:off x="533400" y="3060175"/>
+            <a:ext cx="1844194" cy="335929"/>
+          </a:xfrm>
+          <a:prstGeom prst="rect">
+            <a:avLst/>
+          </a:prstGeom>
+          <a:solidFill>
+            <a:schemeClr val="accent6">
+              <a:lumMod val="75000"/>
+            </a:schemeClr>
+          </a:solidFill>
+        </p:spPr>
+        <p:style>
+          <a:lnRef idx="2">
+            <a:schemeClr val="accent1">
+              <a:shade val="50000"/>
+            </a:schemeClr>
+          </a:lnRef>
+          <a:fillRef idx="1">
+            <a:schemeClr val="accent1"/>
+          </a:fillRef>
+          <a:effectRef idx="0">
+            <a:schemeClr val="accent1"/>
+          </a:effectRef>
+          <a:fontRef idx="minor">
+            <a:schemeClr val="lt1"/>
+          </a:fontRef>
+        </p:style>
+        <p:txBody>
+          <a:bodyPr rtlCol="0" anchor="ctr"/>
+          <a:lstStyle/>
+          <a:p>
+            <a:pPr algn="ctr" defTabSz="685800"/>
+            <a:r>
+              <a:rPr lang="en-US" sz="1350" dirty="0">
+                <a:solidFill>
+                  <a:prstClr val="white"/>
+                </a:solidFill>
+                <a:latin typeface="Calibri" panose="020F0502020204030204"/>
+              </a:rPr>
+              <a:t>Arduino</a:t>
+            </a:r>
+          </a:p>
+        </p:txBody>
+      </p:sp>
+      <p:grpSp>
+        <p:nvGrpSpPr>
+          <p:cNvPr id="80" name="Group 79">
+            <a:extLst>
+              <a:ext uri="{FF2B5EF4-FFF2-40B4-BE49-F238E27FC236}">
+                <a16:creationId xmlns:a16="http://schemas.microsoft.com/office/drawing/2014/main" id="{6D0C95A6-D05E-59D8-8774-893EE5C8718A}"/>
+              </a:ext>
+            </a:extLst>
+          </p:cNvPr>
+          <p:cNvGrpSpPr/>
+          <p:nvPr/>
+        </p:nvGrpSpPr>
+        <p:grpSpPr>
+          <a:xfrm>
+            <a:off x="676200" y="1395918"/>
+            <a:ext cx="1558593" cy="1658915"/>
+            <a:chOff x="676200" y="1395918"/>
+            <a:chExt cx="1558593" cy="1658915"/>
+          </a:xfrm>
+        </p:grpSpPr>
+        <p:grpSp>
+          <p:nvGrpSpPr>
+            <p:cNvPr id="77" name="Group 76">
+              <a:extLst>
+                <a:ext uri="{FF2B5EF4-FFF2-40B4-BE49-F238E27FC236}">
+                  <a16:creationId xmlns:a16="http://schemas.microsoft.com/office/drawing/2014/main" id="{FEF1B371-BE36-B81F-D2AB-161B68F1DD22}"/>
+                </a:ext>
+              </a:extLst>
+            </p:cNvPr>
+            <p:cNvGrpSpPr/>
+            <p:nvPr/>
+          </p:nvGrpSpPr>
+          <p:grpSpPr>
+            <a:xfrm>
+              <a:off x="676200" y="1395918"/>
+              <a:ext cx="1558593" cy="1182784"/>
+              <a:chOff x="676200" y="1497855"/>
+              <a:chExt cx="1558593" cy="1182784"/>
+            </a:xfrm>
+          </p:grpSpPr>
+          <p:sp>
+            <p:nvSpPr>
+              <p:cNvPr id="37" name="Rectangle: Rounded Corners 36">
+                <a:extLst>
+                  <a:ext uri="{FF2B5EF4-FFF2-40B4-BE49-F238E27FC236}">
+                    <a16:creationId xmlns:a16="http://schemas.microsoft.com/office/drawing/2014/main" id="{A9FCA151-222C-6345-65A6-EF65B614725C}"/>
+                  </a:ext>
+                </a:extLst>
+              </p:cNvPr>
+              <p:cNvSpPr/>
+              <p:nvPr/>
+            </p:nvSpPr>
+            <p:spPr>
+              <a:xfrm>
+                <a:off x="676200" y="1576219"/>
+                <a:ext cx="1490030" cy="1104420"/>
+              </a:xfrm>
+              <a:prstGeom prst="roundRect">
+                <a:avLst/>
+              </a:prstGeom>
+              <a:solidFill>
+                <a:schemeClr val="accent6">
+                  <a:lumMod val="20000"/>
+                  <a:lumOff val="80000"/>
+                </a:schemeClr>
+              </a:solidFill>
+            </p:spPr>
+            <p:style>
+              <a:lnRef idx="2">
+                <a:schemeClr val="accent1">
+                  <a:shade val="50000"/>
+                </a:schemeClr>
+              </a:lnRef>
+              <a:fillRef idx="1">
+                <a:schemeClr val="accent1"/>
+              </a:fillRef>
+              <a:effectRef idx="0">
+                <a:schemeClr val="accent1"/>
+              </a:effectRef>
+              <a:fontRef idx="minor">
+                <a:schemeClr val="lt1"/>
+              </a:fontRef>
+            </p:style>
+            <p:txBody>
+              <a:bodyPr rtlCol="0" anchor="ctr"/>
+              <a:lstStyle/>
+              <a:p>
+                <a:pPr algn="ctr" defTabSz="685800"/>
+                <a:endParaRPr lang="en-US" sz="1350" dirty="0">
+                  <a:solidFill>
+                    <a:prstClr val="black"/>
+                  </a:solidFill>
+                  <a:latin typeface="Calibri" panose="020F0502020204030204"/>
+                </a:endParaRPr>
+              </a:p>
+            </p:txBody>
+          </p:sp>
+          <p:sp>
+            <p:nvSpPr>
+              <p:cNvPr id="28" name="Rectangle 27">
+                <a:extLst>
+                  <a:ext uri="{FF2B5EF4-FFF2-40B4-BE49-F238E27FC236}">
+                    <a16:creationId xmlns:a16="http://schemas.microsoft.com/office/drawing/2014/main" id="{4549E184-EA35-EE5E-9032-E7902BC0060D}"/>
+                  </a:ext>
+                </a:extLst>
+              </p:cNvPr>
+              <p:cNvSpPr/>
+              <p:nvPr/>
+            </p:nvSpPr>
+            <p:spPr>
+              <a:xfrm>
+                <a:off x="855460" y="1899355"/>
+                <a:ext cx="866316" cy="685747"/>
+              </a:xfrm>
+              <a:prstGeom prst="rect">
+                <a:avLst/>
+              </a:prstGeom>
+              <a:solidFill>
+                <a:srgbClr val="F04646"/>
+              </a:solidFill>
+            </p:spPr>
+            <p:style>
+              <a:lnRef idx="2">
+                <a:schemeClr val="accent1">
+                  <a:shade val="50000"/>
+                </a:schemeClr>
+              </a:lnRef>
+              <a:fillRef idx="1">
+                <a:schemeClr val="accent1"/>
+              </a:fillRef>
+              <a:effectRef idx="0">
+                <a:schemeClr val="accent1"/>
+              </a:effectRef>
+              <a:fontRef idx="minor">
+                <a:schemeClr val="lt1"/>
+              </a:fontRef>
+            </p:style>
+            <p:txBody>
+              <a:bodyPr rtlCol="0" anchor="ctr"/>
+              <a:lstStyle/>
+              <a:p>
+                <a:pPr algn="ctr" defTabSz="685800"/>
+                <a:endParaRPr lang="en-US" sz="1350">
+                  <a:solidFill>
+                    <a:prstClr val="white"/>
+                  </a:solidFill>
+                  <a:latin typeface="Calibri" panose="020F0502020204030204"/>
+                </a:endParaRPr>
+              </a:p>
+            </p:txBody>
+          </p:sp>
+          <p:sp>
+            <p:nvSpPr>
+              <p:cNvPr id="29" name="Flowchart: Or 28">
+                <a:extLst>
+                  <a:ext uri="{FF2B5EF4-FFF2-40B4-BE49-F238E27FC236}">
+                    <a16:creationId xmlns:a16="http://schemas.microsoft.com/office/drawing/2014/main" id="{8E98ED24-B4D9-F959-0FB0-3F67B45D0A38}"/>
+                  </a:ext>
+                </a:extLst>
+              </p:cNvPr>
+              <p:cNvSpPr/>
+              <p:nvPr/>
+            </p:nvSpPr>
+            <p:spPr>
+              <a:xfrm>
+                <a:off x="1121739" y="2157277"/>
+                <a:ext cx="333758" cy="343083"/>
+              </a:xfrm>
+              <a:prstGeom prst="flowChartOr">
+                <a:avLst/>
+              </a:prstGeom>
+            </p:spPr>
+            <p:style>
+              <a:lnRef idx="2">
+                <a:schemeClr val="accent4">
+                  <a:shade val="50000"/>
+                </a:schemeClr>
+              </a:lnRef>
+              <a:fillRef idx="1">
+                <a:schemeClr val="accent4"/>
+              </a:fillRef>
+              <a:effectRef idx="0">
+                <a:schemeClr val="accent4"/>
+              </a:effectRef>
+              <a:fontRef idx="minor">
+                <a:schemeClr val="lt1"/>
+              </a:fontRef>
+            </p:style>
+            <p:txBody>
+              <a:bodyPr rtlCol="0" anchor="ctr"/>
+              <a:lstStyle/>
+              <a:p>
+                <a:pPr algn="ctr" defTabSz="685800"/>
+                <a:endParaRPr lang="en-US" sz="1350">
+                  <a:solidFill>
+                    <a:prstClr val="white"/>
+                  </a:solidFill>
+                  <a:latin typeface="Calibri" panose="020F0502020204030204"/>
+                </a:endParaRPr>
+              </a:p>
+            </p:txBody>
+          </p:sp>
+          <p:sp>
+            <p:nvSpPr>
+              <p:cNvPr id="21" name="TextBox 20">
+                <a:extLst>
+                  <a:ext uri="{FF2B5EF4-FFF2-40B4-BE49-F238E27FC236}">
+                    <a16:creationId xmlns:a16="http://schemas.microsoft.com/office/drawing/2014/main" id="{A594CB13-989B-2F3C-77FE-AE6AB80687D4}"/>
+                  </a:ext>
+                </a:extLst>
+              </p:cNvPr>
+              <p:cNvSpPr txBox="1"/>
+              <p:nvPr/>
+            </p:nvSpPr>
+            <p:spPr>
+              <a:xfrm>
+                <a:off x="952869" y="1898379"/>
+                <a:ext cx="866316" cy="300082"/>
+              </a:xfrm>
+              <a:prstGeom prst="rect">
+                <a:avLst/>
+              </a:prstGeom>
+              <a:noFill/>
+            </p:spPr>
+            <p:txBody>
+              <a:bodyPr wrap="square" rtlCol="0">
+                <a:spAutoFit/>
+              </a:bodyPr>
+              <a:lstStyle/>
+              <a:p>
+                <a:pPr defTabSz="685800"/>
+                <a:r>
+                  <a:rPr lang="en-US" sz="1350" dirty="0">
+                    <a:solidFill>
+                      <a:prstClr val="black"/>
+                    </a:solidFill>
+                    <a:latin typeface="Calibri" panose="020F0502020204030204"/>
+                  </a:rPr>
+                  <a:t>Buttons</a:t>
+                </a:r>
+              </a:p>
+            </p:txBody>
+          </p:sp>
+          <p:grpSp>
+            <p:nvGrpSpPr>
+              <p:cNvPr id="73" name="Group 72">
+                <a:extLst>
+                  <a:ext uri="{FF2B5EF4-FFF2-40B4-BE49-F238E27FC236}">
+                    <a16:creationId xmlns:a16="http://schemas.microsoft.com/office/drawing/2014/main" id="{F6E72A20-A7F7-A112-0539-C2BF6326AF5C}"/>
+                  </a:ext>
+                </a:extLst>
+              </p:cNvPr>
+              <p:cNvGrpSpPr/>
+              <p:nvPr/>
+            </p:nvGrpSpPr>
+            <p:grpSpPr>
+              <a:xfrm>
+                <a:off x="1753287" y="1916484"/>
+                <a:ext cx="420697" cy="353503"/>
+                <a:chOff x="722303" y="4047047"/>
+                <a:chExt cx="420697" cy="353503"/>
+              </a:xfrm>
+            </p:grpSpPr>
+            <p:sp>
+              <p:nvSpPr>
+                <p:cNvPr id="52" name="Star: 7 Points 51">
+                  <a:extLst>
+                    <a:ext uri="{FF2B5EF4-FFF2-40B4-BE49-F238E27FC236}">
+                      <a16:creationId xmlns:a16="http://schemas.microsoft.com/office/drawing/2014/main" id="{AB5AF3A0-5BC8-5D41-2A53-A90098075F82}"/>
+                    </a:ext>
+                  </a:extLst>
+                </p:cNvPr>
+                <p:cNvSpPr/>
+                <p:nvPr/>
+              </p:nvSpPr>
+              <p:spPr>
+                <a:xfrm>
+                  <a:off x="840428" y="4047047"/>
+                  <a:ext cx="184447" cy="192393"/>
+                </a:xfrm>
+                <a:prstGeom prst="star7">
+                  <a:avLst>
+                    <a:gd name="adj" fmla="val 34601"/>
+                    <a:gd name="hf" fmla="val 102572"/>
+                    <a:gd name="vf" fmla="val 105210"/>
+                  </a:avLst>
+                </a:prstGeom>
+                <a:solidFill>
+                  <a:srgbClr val="FF0000"/>
+                </a:solidFill>
+              </p:spPr>
+              <p:style>
+                <a:lnRef idx="2">
+                  <a:schemeClr val="accent1">
+                    <a:shade val="50000"/>
+                  </a:schemeClr>
+                </a:lnRef>
+                <a:fillRef idx="1">
+                  <a:schemeClr val="accent1"/>
+                </a:fillRef>
+                <a:effectRef idx="0">
+                  <a:schemeClr val="accent1"/>
+                </a:effectRef>
+                <a:fontRef idx="minor">
+                  <a:schemeClr val="lt1"/>
+                </a:fontRef>
+              </p:style>
+              <p:txBody>
+                <a:bodyPr rtlCol="0" anchor="ctr"/>
+                <a:lstStyle/>
+                <a:p>
+                  <a:pPr algn="ctr" defTabSz="685800"/>
+                  <a:endParaRPr lang="en-US" sz="1350">
+                    <a:solidFill>
+                      <a:prstClr val="white"/>
+                    </a:solidFill>
+                    <a:latin typeface="Calibri" panose="020F0502020204030204"/>
+                  </a:endParaRPr>
+                </a:p>
+              </p:txBody>
+            </p:sp>
+            <p:sp>
+              <p:nvSpPr>
+                <p:cNvPr id="53" name="TextBox 52">
+                  <a:extLst>
+                    <a:ext uri="{FF2B5EF4-FFF2-40B4-BE49-F238E27FC236}">
+                      <a16:creationId xmlns:a16="http://schemas.microsoft.com/office/drawing/2014/main" id="{C4867530-D336-864F-EF26-DF6F749C2CC0}"/>
+                    </a:ext>
+                  </a:extLst>
+                </p:cNvPr>
+                <p:cNvSpPr txBox="1"/>
+                <p:nvPr/>
+              </p:nvSpPr>
+              <p:spPr>
+                <a:xfrm>
+                  <a:off x="722303" y="4214836"/>
+                  <a:ext cx="420697" cy="185714"/>
+                </a:xfrm>
+                <a:prstGeom prst="rect">
+                  <a:avLst/>
+                </a:prstGeom>
+                <a:noFill/>
+              </p:spPr>
+              <p:txBody>
+                <a:bodyPr wrap="square" rtlCol="0">
+                  <a:spAutoFit/>
+                </a:bodyPr>
+                <a:lstStyle/>
+                <a:p>
+                  <a:pPr algn="ctr" defTabSz="685800"/>
+                  <a:r>
+                    <a:rPr lang="en-US" sz="750" dirty="0">
+                      <a:solidFill>
+                        <a:prstClr val="black"/>
+                      </a:solidFill>
+                      <a:latin typeface="Calibri" panose="020F0502020204030204"/>
+                    </a:rPr>
+                    <a:t>Lights</a:t>
+                  </a:r>
+                </a:p>
+              </p:txBody>
+            </p:sp>
+          </p:grpSp>
+          <p:sp>
+            <p:nvSpPr>
+              <p:cNvPr id="74" name="TextBox 73">
+                <a:extLst>
+                  <a:ext uri="{FF2B5EF4-FFF2-40B4-BE49-F238E27FC236}">
+                    <a16:creationId xmlns:a16="http://schemas.microsoft.com/office/drawing/2014/main" id="{F9C8D356-B892-911E-0FE4-1413CF934906}"/>
+                  </a:ext>
+                </a:extLst>
+              </p:cNvPr>
+              <p:cNvSpPr txBox="1"/>
+              <p:nvPr/>
+            </p:nvSpPr>
+            <p:spPr>
+              <a:xfrm>
+                <a:off x="676200" y="1497855"/>
+                <a:ext cx="1558593" cy="369332"/>
+              </a:xfrm>
+              <a:prstGeom prst="rect">
+                <a:avLst/>
+              </a:prstGeom>
+              <a:noFill/>
+            </p:spPr>
+            <p:txBody>
+              <a:bodyPr wrap="square" rtlCol="0">
+                <a:spAutoFit/>
+              </a:bodyPr>
+              <a:lstStyle/>
+              <a:p>
+                <a:r>
+                  <a:rPr lang="en-US" dirty="0"/>
+                  <a:t>User Interface</a:t>
+                </a:r>
+              </a:p>
+            </p:txBody>
+          </p:sp>
+        </p:grpSp>
+        <p:sp>
+          <p:nvSpPr>
+            <p:cNvPr id="79" name="Arrow: Up-Down 78">
+              <a:extLst>
+                <a:ext uri="{FF2B5EF4-FFF2-40B4-BE49-F238E27FC236}">
+                  <a16:creationId xmlns:a16="http://schemas.microsoft.com/office/drawing/2014/main" id="{F30AEF4C-D60F-447F-37F0-CCAF4939558D}"/>
+                </a:ext>
+              </a:extLst>
+            </p:cNvPr>
+            <p:cNvSpPr/>
+            <p:nvPr/>
+          </p:nvSpPr>
+          <p:spPr>
+            <a:xfrm>
+              <a:off x="1314128" y="2586062"/>
+              <a:ext cx="214173" cy="468771"/>
+            </a:xfrm>
+            <a:prstGeom prst="upDownArrow">
+              <a:avLst/>
+            </a:prstGeom>
+            <a:solidFill>
+              <a:srgbClr val="FFFF00"/>
+            </a:solidFill>
+          </p:spPr>
+          <p:style>
+            <a:lnRef idx="2">
+              <a:schemeClr val="accent1">
+                <a:shade val="50000"/>
+              </a:schemeClr>
+            </a:lnRef>
+            <a:fillRef idx="1">
+              <a:schemeClr val="accent1"/>
+            </a:fillRef>
+            <a:effectRef idx="0">
+              <a:schemeClr val="accent1"/>
+            </a:effectRef>
+            <a:fontRef idx="minor">
+              <a:schemeClr val="lt1"/>
+            </a:fontRef>
+          </p:style>
+          <p:txBody>
+            <a:bodyPr rtlCol="0" anchor="ctr"/>
+            <a:lstStyle/>
+            <a:p>
+              <a:pPr algn="ctr"/>
+              <a:endParaRPr lang="en-US"/>
+            </a:p>
+          </p:txBody>
+        </p:sp>
+      </p:grpSp>
+      <p:grpSp>
+        <p:nvGrpSpPr>
+          <p:cNvPr id="83" name="Group 82">
+            <a:extLst>
+              <a:ext uri="{FF2B5EF4-FFF2-40B4-BE49-F238E27FC236}">
+                <a16:creationId xmlns:a16="http://schemas.microsoft.com/office/drawing/2014/main" id="{7EEEA42E-D3A6-6D36-377F-EC1A7122AE80}"/>
+              </a:ext>
+            </a:extLst>
+          </p:cNvPr>
+          <p:cNvGrpSpPr/>
+          <p:nvPr/>
+        </p:nvGrpSpPr>
+        <p:grpSpPr>
+          <a:xfrm>
+            <a:off x="533400" y="3404856"/>
+            <a:ext cx="4190999" cy="815643"/>
+            <a:chOff x="533400" y="3404856"/>
+            <a:chExt cx="4190999" cy="815643"/>
+          </a:xfrm>
+        </p:grpSpPr>
+        <p:sp>
+          <p:nvSpPr>
+            <p:cNvPr id="64" name="Rectangle 63">
+              <a:extLst>
+                <a:ext uri="{FF2B5EF4-FFF2-40B4-BE49-F238E27FC236}">
+                  <a16:creationId xmlns:a16="http://schemas.microsoft.com/office/drawing/2014/main" id="{4F591C1F-289B-B865-12FA-115062D2112A}"/>
+                </a:ext>
+              </a:extLst>
+            </p:cNvPr>
+            <p:cNvSpPr/>
+            <p:nvPr/>
+          </p:nvSpPr>
+          <p:spPr>
+            <a:xfrm>
+              <a:off x="533400" y="3884570"/>
+              <a:ext cx="1820650" cy="335929"/>
+            </a:xfrm>
+            <a:prstGeom prst="rect">
+              <a:avLst/>
+            </a:prstGeom>
+            <a:solidFill>
+              <a:srgbClr val="FF0000"/>
+            </a:solidFill>
+          </p:spPr>
+          <p:style>
+            <a:lnRef idx="2">
+              <a:schemeClr val="accent1">
+                <a:shade val="50000"/>
+              </a:schemeClr>
+            </a:lnRef>
+            <a:fillRef idx="1">
+              <a:schemeClr val="accent1"/>
+            </a:fillRef>
+            <a:effectRef idx="0">
+              <a:schemeClr val="accent1"/>
+            </a:effectRef>
+            <a:fontRef idx="minor">
+              <a:schemeClr val="lt1"/>
+            </a:fontRef>
+          </p:style>
+          <p:txBody>
+            <a:bodyPr rtlCol="0" anchor="ctr"/>
+            <a:lstStyle/>
+            <a:p>
+              <a:pPr algn="ctr" defTabSz="685800"/>
+              <a:r>
+                <a:rPr lang="en-US" sz="1350" dirty="0">
+                  <a:solidFill>
+                    <a:prstClr val="white"/>
+                  </a:solidFill>
+                  <a:latin typeface="Calibri" panose="020F0502020204030204"/>
+                </a:rPr>
+                <a:t>Motor Power</a:t>
+              </a:r>
+            </a:p>
+          </p:txBody>
+        </p:sp>
+        <p:sp>
+          <p:nvSpPr>
+            <p:cNvPr id="81" name="Arrow: Up-Down 80">
+              <a:extLst>
+                <a:ext uri="{FF2B5EF4-FFF2-40B4-BE49-F238E27FC236}">
+                  <a16:creationId xmlns:a16="http://schemas.microsoft.com/office/drawing/2014/main" id="{89C723ED-3D4C-A1AF-87D6-1128256B10CE}"/>
+                </a:ext>
+              </a:extLst>
+            </p:cNvPr>
+            <p:cNvSpPr/>
+            <p:nvPr/>
+          </p:nvSpPr>
+          <p:spPr>
+            <a:xfrm>
+              <a:off x="1314128" y="3404856"/>
+              <a:ext cx="214173" cy="468771"/>
+            </a:xfrm>
+            <a:prstGeom prst="upDownArrow">
+              <a:avLst/>
+            </a:prstGeom>
+            <a:solidFill>
+              <a:srgbClr val="FFFF00"/>
+            </a:solidFill>
+          </p:spPr>
+          <p:style>
+            <a:lnRef idx="2">
+              <a:schemeClr val="accent1">
+                <a:shade val="50000"/>
+              </a:schemeClr>
+            </a:lnRef>
+            <a:fillRef idx="1">
+              <a:schemeClr val="accent1"/>
+            </a:fillRef>
+            <a:effectRef idx="0">
+              <a:schemeClr val="accent1"/>
+            </a:effectRef>
+            <a:fontRef idx="minor">
+              <a:schemeClr val="lt1"/>
+            </a:fontRef>
+          </p:style>
+          <p:txBody>
+            <a:bodyPr rtlCol="0" anchor="ctr"/>
+            <a:lstStyle/>
+            <a:p>
+              <a:pPr algn="ctr"/>
+              <a:endParaRPr lang="en-US"/>
+            </a:p>
+          </p:txBody>
+        </p:sp>
+        <p:sp>
+          <p:nvSpPr>
+            <p:cNvPr id="82" name="Arrow: Up-Down 81">
+              <a:extLst>
+                <a:ext uri="{FF2B5EF4-FFF2-40B4-BE49-F238E27FC236}">
+                  <a16:creationId xmlns:a16="http://schemas.microsoft.com/office/drawing/2014/main" id="{4669BE03-E9F5-E1A3-0F5A-42E34F617092}"/>
+                </a:ext>
+              </a:extLst>
+            </p:cNvPr>
+            <p:cNvSpPr/>
+            <p:nvPr/>
+          </p:nvSpPr>
+          <p:spPr>
+            <a:xfrm rot="5400000">
+              <a:off x="3436687" y="2811031"/>
+              <a:ext cx="214173" cy="2361251"/>
+            </a:xfrm>
+            <a:prstGeom prst="upDownArrow">
+              <a:avLst/>
+            </a:prstGeom>
+            <a:solidFill>
+              <a:srgbClr val="FFFF00"/>
+            </a:solidFill>
+          </p:spPr>
+          <p:style>
+            <a:lnRef idx="2">
+              <a:schemeClr val="accent1">
+                <a:shade val="50000"/>
+              </a:schemeClr>
+            </a:lnRef>
+            <a:fillRef idx="1">
+              <a:schemeClr val="accent1"/>
+            </a:fillRef>
+            <a:effectRef idx="0">
+              <a:schemeClr val="accent1"/>
+            </a:effectRef>
+            <a:fontRef idx="minor">
+              <a:schemeClr val="lt1"/>
+            </a:fontRef>
+          </p:style>
+          <p:txBody>
+            <a:bodyPr rtlCol="0" anchor="ctr"/>
+            <a:lstStyle/>
+            <a:p>
+              <a:pPr algn="ctr"/>
+              <a:endParaRPr lang="en-US"/>
+            </a:p>
+          </p:txBody>
+        </p:sp>
+      </p:grpSp>
     </p:spTree>
     <p:extLst>
       <p:ext uri="{BB962C8B-B14F-4D97-AF65-F5344CB8AC3E}">
@@ -5713,10 +7905,531 @@
   <p:clrMapOvr>
     <a:masterClrMapping/>
   </p:clrMapOvr>
+  <p:timing>
+    <p:tnLst>
+      <p:par>
+        <p:cTn id="1" dur="indefinite" restart="never" nodeType="tmRoot">
+          <p:childTnLst>
+            <p:seq concurrent="1" nextAc="seek">
+              <p:cTn id="2" dur="indefinite" nodeType="mainSeq">
+                <p:childTnLst>
+                  <p:par>
+                    <p:cTn id="3" fill="hold">
+                      <p:stCondLst>
+                        <p:cond delay="indefinite"/>
+                      </p:stCondLst>
+                      <p:childTnLst>
+                        <p:par>
+                          <p:cTn id="4" fill="hold">
+                            <p:stCondLst>
+                              <p:cond delay="0"/>
+                            </p:stCondLst>
+                            <p:childTnLst>
+                              <p:par>
+                                <p:cTn id="5" presetID="10" presetClass="entr" presetSubtype="0" fill="hold" nodeType="clickEffect">
+                                  <p:stCondLst>
+                                    <p:cond delay="0"/>
+                                  </p:stCondLst>
+                                  <p:childTnLst>
+                                    <p:set>
+                                      <p:cBhvr>
+                                        <p:cTn id="6" dur="1" fill="hold">
+                                          <p:stCondLst>
+                                            <p:cond delay="0"/>
+                                          </p:stCondLst>
+                                        </p:cTn>
+                                        <p:tgtEl>
+                                          <p:spTgt spid="78"/>
+                                        </p:tgtEl>
+                                        <p:attrNameLst>
+                                          <p:attrName>style.visibility</p:attrName>
+                                        </p:attrNameLst>
+                                      </p:cBhvr>
+                                      <p:to>
+                                        <p:strVal val="visible"/>
+                                      </p:to>
+                                    </p:set>
+                                    <p:animEffect transition="in" filter="fade">
+                                      <p:cBhvr>
+                                        <p:cTn id="7" dur="500"/>
+                                        <p:tgtEl>
+                                          <p:spTgt spid="78"/>
+                                        </p:tgtEl>
+                                      </p:cBhvr>
+                                    </p:animEffect>
+                                  </p:childTnLst>
+                                </p:cTn>
+                              </p:par>
+                            </p:childTnLst>
+                          </p:cTn>
+                        </p:par>
+                      </p:childTnLst>
+                    </p:cTn>
+                  </p:par>
+                  <p:par>
+                    <p:cTn id="8" fill="hold">
+                      <p:stCondLst>
+                        <p:cond delay="indefinite"/>
+                      </p:stCondLst>
+                      <p:childTnLst>
+                        <p:par>
+                          <p:cTn id="9" fill="hold">
+                            <p:stCondLst>
+                              <p:cond delay="0"/>
+                            </p:stCondLst>
+                            <p:childTnLst>
+                              <p:par>
+                                <p:cTn id="10" presetID="45" presetClass="entr" presetSubtype="0" fill="hold" nodeType="clickEffect">
+                                  <p:stCondLst>
+                                    <p:cond delay="0"/>
+                                  </p:stCondLst>
+                                  <p:childTnLst>
+                                    <p:set>
+                                      <p:cBhvr>
+                                        <p:cTn id="11" dur="1" fill="hold">
+                                          <p:stCondLst>
+                                            <p:cond delay="0"/>
+                                          </p:stCondLst>
+                                        </p:cTn>
+                                        <p:tgtEl>
+                                          <p:spTgt spid="6"/>
+                                        </p:tgtEl>
+                                        <p:attrNameLst>
+                                          <p:attrName>style.visibility</p:attrName>
+                                        </p:attrNameLst>
+                                      </p:cBhvr>
+                                      <p:to>
+                                        <p:strVal val="visible"/>
+                                      </p:to>
+                                    </p:set>
+                                    <p:animEffect transition="in" filter="fade">
+                                      <p:cBhvr>
+                                        <p:cTn id="12" dur="2000"/>
+                                        <p:tgtEl>
+                                          <p:spTgt spid="6"/>
+                                        </p:tgtEl>
+                                      </p:cBhvr>
+                                    </p:animEffect>
+                                    <p:anim calcmode="lin" valueType="num">
+                                      <p:cBhvr>
+                                        <p:cTn id="13" dur="2000" fill="hold"/>
+                                        <p:tgtEl>
+                                          <p:spTgt spid="6"/>
+                                        </p:tgtEl>
+                                        <p:attrNameLst>
+                                          <p:attrName>ppt_w</p:attrName>
+                                        </p:attrNameLst>
+                                      </p:cBhvr>
+                                      <p:tavLst>
+                                        <p:tav tm="0" fmla="#ppt_w*sin(2.5*pi*$)">
+                                          <p:val>
+                                            <p:fltVal val="0"/>
+                                          </p:val>
+                                        </p:tav>
+                                        <p:tav tm="100000">
+                                          <p:val>
+                                            <p:fltVal val="1"/>
+                                          </p:val>
+                                        </p:tav>
+                                      </p:tavLst>
+                                    </p:anim>
+                                    <p:anim calcmode="lin" valueType="num">
+                                      <p:cBhvr>
+                                        <p:cTn id="14" dur="2000" fill="hold"/>
+                                        <p:tgtEl>
+                                          <p:spTgt spid="6"/>
+                                        </p:tgtEl>
+                                        <p:attrNameLst>
+                                          <p:attrName>ppt_h</p:attrName>
+                                        </p:attrNameLst>
+                                      </p:cBhvr>
+                                      <p:tavLst>
+                                        <p:tav tm="0">
+                                          <p:val>
+                                            <p:strVal val="#ppt_h"/>
+                                          </p:val>
+                                        </p:tav>
+                                        <p:tav tm="100000">
+                                          <p:val>
+                                            <p:strVal val="#ppt_h"/>
+                                          </p:val>
+                                        </p:tav>
+                                      </p:tavLst>
+                                    </p:anim>
+                                  </p:childTnLst>
+                                </p:cTn>
+                              </p:par>
+                            </p:childTnLst>
+                          </p:cTn>
+                        </p:par>
+                      </p:childTnLst>
+                    </p:cTn>
+                  </p:par>
+                  <p:par>
+                    <p:cTn id="15" fill="hold">
+                      <p:stCondLst>
+                        <p:cond delay="indefinite"/>
+                      </p:stCondLst>
+                      <p:childTnLst>
+                        <p:par>
+                          <p:cTn id="16" fill="hold">
+                            <p:stCondLst>
+                              <p:cond delay="0"/>
+                            </p:stCondLst>
+                            <p:childTnLst>
+                              <p:par>
+                                <p:cTn id="17" presetID="22" presetClass="entr" presetSubtype="4" fill="hold" grpId="0" nodeType="clickEffect">
+                                  <p:stCondLst>
+                                    <p:cond delay="0"/>
+                                  </p:stCondLst>
+                                  <p:childTnLst>
+                                    <p:set>
+                                      <p:cBhvr>
+                                        <p:cTn id="18" dur="1" fill="hold">
+                                          <p:stCondLst>
+                                            <p:cond delay="0"/>
+                                          </p:stCondLst>
+                                        </p:cTn>
+                                        <p:tgtEl>
+                                          <p:spTgt spid="41"/>
+                                        </p:tgtEl>
+                                        <p:attrNameLst>
+                                          <p:attrName>style.visibility</p:attrName>
+                                        </p:attrNameLst>
+                                      </p:cBhvr>
+                                      <p:to>
+                                        <p:strVal val="visible"/>
+                                      </p:to>
+                                    </p:set>
+                                    <p:animEffect transition="in" filter="wipe(down)">
+                                      <p:cBhvr>
+                                        <p:cTn id="19" dur="500"/>
+                                        <p:tgtEl>
+                                          <p:spTgt spid="41"/>
+                                        </p:tgtEl>
+                                      </p:cBhvr>
+                                    </p:animEffect>
+                                  </p:childTnLst>
+                                </p:cTn>
+                              </p:par>
+                            </p:childTnLst>
+                          </p:cTn>
+                        </p:par>
+                      </p:childTnLst>
+                    </p:cTn>
+                  </p:par>
+                  <p:par>
+                    <p:cTn id="20" fill="hold">
+                      <p:stCondLst>
+                        <p:cond delay="indefinite"/>
+                      </p:stCondLst>
+                      <p:childTnLst>
+                        <p:par>
+                          <p:cTn id="21" fill="hold">
+                            <p:stCondLst>
+                              <p:cond delay="0"/>
+                            </p:stCondLst>
+                            <p:childTnLst>
+                              <p:par>
+                                <p:cTn id="22" presetID="10" presetClass="entr" presetSubtype="0" fill="hold" nodeType="clickEffect">
+                                  <p:stCondLst>
+                                    <p:cond delay="0"/>
+                                  </p:stCondLst>
+                                  <p:childTnLst>
+                                    <p:set>
+                                      <p:cBhvr>
+                                        <p:cTn id="23" dur="1" fill="hold">
+                                          <p:stCondLst>
+                                            <p:cond delay="0"/>
+                                          </p:stCondLst>
+                                        </p:cTn>
+                                        <p:tgtEl>
+                                          <p:spTgt spid="80"/>
+                                        </p:tgtEl>
+                                        <p:attrNameLst>
+                                          <p:attrName>style.visibility</p:attrName>
+                                        </p:attrNameLst>
+                                      </p:cBhvr>
+                                      <p:to>
+                                        <p:strVal val="visible"/>
+                                      </p:to>
+                                    </p:set>
+                                    <p:animEffect transition="in" filter="fade">
+                                      <p:cBhvr>
+                                        <p:cTn id="24" dur="500"/>
+                                        <p:tgtEl>
+                                          <p:spTgt spid="80"/>
+                                        </p:tgtEl>
+                                      </p:cBhvr>
+                                    </p:animEffect>
+                                  </p:childTnLst>
+                                </p:cTn>
+                              </p:par>
+                            </p:childTnLst>
+                          </p:cTn>
+                        </p:par>
+                      </p:childTnLst>
+                    </p:cTn>
+                  </p:par>
+                  <p:par>
+                    <p:cTn id="25" fill="hold">
+                      <p:stCondLst>
+                        <p:cond delay="indefinite"/>
+                      </p:stCondLst>
+                      <p:childTnLst>
+                        <p:par>
+                          <p:cTn id="26" fill="hold">
+                            <p:stCondLst>
+                              <p:cond delay="0"/>
+                            </p:stCondLst>
+                            <p:childTnLst>
+                              <p:par>
+                                <p:cTn id="27" presetID="21" presetClass="entr" presetSubtype="1" fill="hold" grpId="0" nodeType="clickEffect">
+                                  <p:stCondLst>
+                                    <p:cond delay="0"/>
+                                  </p:stCondLst>
+                                  <p:childTnLst>
+                                    <p:set>
+                                      <p:cBhvr>
+                                        <p:cTn id="28" dur="1" fill="hold">
+                                          <p:stCondLst>
+                                            <p:cond delay="0"/>
+                                          </p:stCondLst>
+                                        </p:cTn>
+                                        <p:tgtEl>
+                                          <p:spTgt spid="11"/>
+                                        </p:tgtEl>
+                                        <p:attrNameLst>
+                                          <p:attrName>style.visibility</p:attrName>
+                                        </p:attrNameLst>
+                                      </p:cBhvr>
+                                      <p:to>
+                                        <p:strVal val="visible"/>
+                                      </p:to>
+                                    </p:set>
+                                    <p:animEffect transition="in" filter="wheel(1)">
+                                      <p:cBhvr>
+                                        <p:cTn id="29" dur="2000"/>
+                                        <p:tgtEl>
+                                          <p:spTgt spid="11"/>
+                                        </p:tgtEl>
+                                      </p:cBhvr>
+                                    </p:animEffect>
+                                  </p:childTnLst>
+                                </p:cTn>
+                              </p:par>
+                            </p:childTnLst>
+                          </p:cTn>
+                        </p:par>
+                      </p:childTnLst>
+                    </p:cTn>
+                  </p:par>
+                  <p:par>
+                    <p:cTn id="30" fill="hold">
+                      <p:stCondLst>
+                        <p:cond delay="indefinite"/>
+                      </p:stCondLst>
+                      <p:childTnLst>
+                        <p:par>
+                          <p:cTn id="31" fill="hold">
+                            <p:stCondLst>
+                              <p:cond delay="0"/>
+                            </p:stCondLst>
+                            <p:childTnLst>
+                              <p:par>
+                                <p:cTn id="32" presetID="10" presetClass="entr" presetSubtype="0" fill="hold" nodeType="clickEffect">
+                                  <p:stCondLst>
+                                    <p:cond delay="0"/>
+                                  </p:stCondLst>
+                                  <p:childTnLst>
+                                    <p:set>
+                                      <p:cBhvr>
+                                        <p:cTn id="33" dur="1" fill="hold">
+                                          <p:stCondLst>
+                                            <p:cond delay="0"/>
+                                          </p:stCondLst>
+                                        </p:cTn>
+                                        <p:tgtEl>
+                                          <p:spTgt spid="83"/>
+                                        </p:tgtEl>
+                                        <p:attrNameLst>
+                                          <p:attrName>style.visibility</p:attrName>
+                                        </p:attrNameLst>
+                                      </p:cBhvr>
+                                      <p:to>
+                                        <p:strVal val="visible"/>
+                                      </p:to>
+                                    </p:set>
+                                    <p:animEffect transition="in" filter="fade">
+                                      <p:cBhvr>
+                                        <p:cTn id="34" dur="500"/>
+                                        <p:tgtEl>
+                                          <p:spTgt spid="83"/>
+                                        </p:tgtEl>
+                                      </p:cBhvr>
+                                    </p:animEffect>
+                                  </p:childTnLst>
+                                </p:cTn>
+                              </p:par>
+                            </p:childTnLst>
+                          </p:cTn>
+                        </p:par>
+                      </p:childTnLst>
+                    </p:cTn>
+                  </p:par>
+                  <p:par>
+                    <p:cTn id="35" fill="hold">
+                      <p:stCondLst>
+                        <p:cond delay="indefinite"/>
+                      </p:stCondLst>
+                      <p:childTnLst>
+                        <p:par>
+                          <p:cTn id="36" fill="hold">
+                            <p:stCondLst>
+                              <p:cond delay="0"/>
+                            </p:stCondLst>
+                            <p:childTnLst>
+                              <p:par>
+                                <p:cTn id="37" presetID="31" presetClass="entr" presetSubtype="0" fill="hold" grpId="0" nodeType="clickEffect">
+                                  <p:stCondLst>
+                                    <p:cond delay="0"/>
+                                  </p:stCondLst>
+                                  <p:childTnLst>
+                                    <p:set>
+                                      <p:cBhvr>
+                                        <p:cTn id="38" dur="1" fill="hold">
+                                          <p:stCondLst>
+                                            <p:cond delay="0"/>
+                                          </p:stCondLst>
+                                        </p:cTn>
+                                        <p:tgtEl>
+                                          <p:spTgt spid="12"/>
+                                        </p:tgtEl>
+                                        <p:attrNameLst>
+                                          <p:attrName>style.visibility</p:attrName>
+                                        </p:attrNameLst>
+                                      </p:cBhvr>
+                                      <p:to>
+                                        <p:strVal val="visible"/>
+                                      </p:to>
+                                    </p:set>
+                                    <p:anim calcmode="lin" valueType="num">
+                                      <p:cBhvr>
+                                        <p:cTn id="39" dur="1000" fill="hold"/>
+                                        <p:tgtEl>
+                                          <p:spTgt spid="12"/>
+                                        </p:tgtEl>
+                                        <p:attrNameLst>
+                                          <p:attrName>ppt_w</p:attrName>
+                                        </p:attrNameLst>
+                                      </p:cBhvr>
+                                      <p:tavLst>
+                                        <p:tav tm="0">
+                                          <p:val>
+                                            <p:fltVal val="0"/>
+                                          </p:val>
+                                        </p:tav>
+                                        <p:tav tm="100000">
+                                          <p:val>
+                                            <p:strVal val="#ppt_w"/>
+                                          </p:val>
+                                        </p:tav>
+                                      </p:tavLst>
+                                    </p:anim>
+                                    <p:anim calcmode="lin" valueType="num">
+                                      <p:cBhvr>
+                                        <p:cTn id="40" dur="1000" fill="hold"/>
+                                        <p:tgtEl>
+                                          <p:spTgt spid="12"/>
+                                        </p:tgtEl>
+                                        <p:attrNameLst>
+                                          <p:attrName>ppt_h</p:attrName>
+                                        </p:attrNameLst>
+                                      </p:cBhvr>
+                                      <p:tavLst>
+                                        <p:tav tm="0">
+                                          <p:val>
+                                            <p:fltVal val="0"/>
+                                          </p:val>
+                                        </p:tav>
+                                        <p:tav tm="100000">
+                                          <p:val>
+                                            <p:strVal val="#ppt_h"/>
+                                          </p:val>
+                                        </p:tav>
+                                      </p:tavLst>
+                                    </p:anim>
+                                    <p:anim calcmode="lin" valueType="num">
+                                      <p:cBhvr>
+                                        <p:cTn id="41" dur="1000" fill="hold"/>
+                                        <p:tgtEl>
+                                          <p:spTgt spid="12"/>
+                                        </p:tgtEl>
+                                        <p:attrNameLst>
+                                          <p:attrName>style.rotation</p:attrName>
+                                        </p:attrNameLst>
+                                      </p:cBhvr>
+                                      <p:tavLst>
+                                        <p:tav tm="0">
+                                          <p:val>
+                                            <p:fltVal val="90"/>
+                                          </p:val>
+                                        </p:tav>
+                                        <p:tav tm="100000">
+                                          <p:val>
+                                            <p:fltVal val="0"/>
+                                          </p:val>
+                                        </p:tav>
+                                      </p:tavLst>
+                                    </p:anim>
+                                    <p:animEffect transition="in" filter="fade">
+                                      <p:cBhvr>
+                                        <p:cTn id="42" dur="1000"/>
+                                        <p:tgtEl>
+                                          <p:spTgt spid="12"/>
+                                        </p:tgtEl>
+                                      </p:cBhvr>
+                                    </p:animEffect>
+                                  </p:childTnLst>
+                                </p:cTn>
+                              </p:par>
+                            </p:childTnLst>
+                          </p:cTn>
+                        </p:par>
+                      </p:childTnLst>
+                    </p:cTn>
+                  </p:par>
+                </p:childTnLst>
+              </p:cTn>
+              <p:prevCondLst>
+                <p:cond evt="onPrev" delay="0">
+                  <p:tgtEl>
+                    <p:sldTgt/>
+                  </p:tgtEl>
+                </p:cond>
+              </p:prevCondLst>
+              <p:nextCondLst>
+                <p:cond evt="onNext" delay="0">
+                  <p:tgtEl>
+                    <p:sldTgt/>
+                  </p:tgtEl>
+                </p:cond>
+              </p:nextCondLst>
+            </p:seq>
+          </p:childTnLst>
+        </p:cTn>
+      </p:par>
+    </p:tnLst>
+    <p:bldLst>
+      <p:bldP spid="11" grpId="0" animBg="1"/>
+      <p:bldP spid="12" grpId="0" animBg="1"/>
+      <p:bldP spid="41" grpId="0" animBg="1"/>
+    </p:bldLst>
+  </p:timing>
 </p:sld>
 </file>
 
-<file path=ppt/slides/slide6.xml><?xml version="1.0" encoding="utf-8"?>
+<file path=ppt/slides/slide7.xml><?xml version="1.0" encoding="utf-8"?>
 <p:sld xmlns:a="http://schemas.openxmlformats.org/drawingml/2006/main" xmlns:r="http://schemas.openxmlformats.org/officeDocument/2006/relationships" xmlns:p="http://schemas.openxmlformats.org/presentationml/2006/main">
   <p:cSld>
     <p:spTree>
@@ -5783,13 +8496,55 @@
         </p:spPr>
         <p:txBody>
           <a:bodyPr>
-            <a:normAutofit/>
+            <a:normAutofit fontScale="92500" lnSpcReduction="20000"/>
           </a:bodyPr>
           <a:lstStyle/>
           <a:p>
             <a:pPr marL="0" indent="0">
               <a:buNone/>
             </a:pPr>
+            <a:r>
+              <a:rPr lang="en-US" dirty="0"/>
+              <a:t>As with many projects there are some initial questions to be answered and some issues that are easily anticipated.</a:t>
+            </a:r>
+          </a:p>
+          <a:p>
+            <a:r>
+              <a:rPr lang="en-US" dirty="0"/>
+              <a:t>What kind of turntable motor and how to drive it?</a:t>
+            </a:r>
+          </a:p>
+          <a:p>
+            <a:r>
+              <a:rPr lang="en-US" dirty="0"/>
+              <a:t>How to measure the bridge position?</a:t>
+            </a:r>
+          </a:p>
+          <a:p>
+            <a:r>
+              <a:rPr lang="en-US" dirty="0"/>
+              <a:t>Can we do it accurately enough?</a:t>
+            </a:r>
+          </a:p>
+          <a:p>
+            <a:r>
+              <a:rPr lang="en-US" dirty="0"/>
+              <a:t>What are the HMI requirements? </a:t>
+            </a:r>
+          </a:p>
+          <a:p>
+            <a:r>
+              <a:rPr lang="en-US" dirty="0"/>
+              <a:t>Will it all work?</a:t>
+            </a:r>
+          </a:p>
+          <a:p>
+            <a:r>
+              <a:rPr lang="en-US" dirty="0"/>
+              <a:t>Will an Arduino even be capable enough?</a:t>
+            </a:r>
+          </a:p>
+          <a:p>
             <a:endParaRPr lang="en-US" dirty="0"/>
           </a:p>
         </p:txBody>
@@ -5843,224 +8598,6 @@
 </p:sld>
 </file>
 
-<file path=ppt/slides/slide7.xml><?xml version="1.0" encoding="utf-8"?>
-<p:sld xmlns:a="http://schemas.openxmlformats.org/drawingml/2006/main" xmlns:r="http://schemas.openxmlformats.org/officeDocument/2006/relationships" xmlns:p="http://schemas.openxmlformats.org/presentationml/2006/main">
-  <p:cSld>
-    <p:spTree>
-      <p:nvGrpSpPr>
-        <p:cNvPr id="1" name=""/>
-        <p:cNvGrpSpPr/>
-        <p:nvPr/>
-      </p:nvGrpSpPr>
-      <p:grpSpPr>
-        <a:xfrm>
-          <a:off x="0" y="0"/>
-          <a:ext cx="0" cy="0"/>
-          <a:chOff x="0" y="0"/>
-          <a:chExt cx="0" cy="0"/>
-        </a:xfrm>
-      </p:grpSpPr>
-      <p:sp>
-        <p:nvSpPr>
-          <p:cNvPr id="4" name="Title 3">
-            <a:extLst>
-              <a:ext uri="{FF2B5EF4-FFF2-40B4-BE49-F238E27FC236}">
-                <a16:creationId xmlns:a16="http://schemas.microsoft.com/office/drawing/2014/main" id="{BDE6CE25-34FB-4714-9DAA-1CEAE47154BE}"/>
-              </a:ext>
-            </a:extLst>
-          </p:cNvPr>
-          <p:cNvSpPr>
-            <a:spLocks noGrp="1"/>
-          </p:cNvSpPr>
-          <p:nvPr>
-            <p:ph type="title"/>
-          </p:nvPr>
-        </p:nvSpPr>
-        <p:spPr>
-          <a:xfrm>
-            <a:off x="659756" y="2416323"/>
-            <a:ext cx="8345486" cy="1021556"/>
-          </a:xfrm>
-        </p:spPr>
-        <p:txBody>
-          <a:bodyPr>
-            <a:normAutofit fontScale="90000"/>
-          </a:bodyPr>
-          <a:lstStyle/>
-          <a:p>
-            <a:r>
-              <a:rPr lang="en-US" dirty="0"/>
-              <a:t>Questions?</a:t>
-            </a:r>
-            <a:br>
-              <a:rPr lang="en-US" dirty="0"/>
-            </a:br>
-            <a:br>
-              <a:rPr lang="en-US" dirty="0"/>
-            </a:br>
-            <a:endParaRPr lang="en-US" dirty="0"/>
-          </a:p>
-        </p:txBody>
-      </p:sp>
-      <p:sp>
-        <p:nvSpPr>
-          <p:cNvPr id="5" name="Text Placeholder 4">
-            <a:extLst>
-              <a:ext uri="{FF2B5EF4-FFF2-40B4-BE49-F238E27FC236}">
-                <a16:creationId xmlns:a16="http://schemas.microsoft.com/office/drawing/2014/main" id="{E0AB60C3-939D-43D0-812C-6CEDD6D880B3}"/>
-              </a:ext>
-            </a:extLst>
-          </p:cNvPr>
-          <p:cNvSpPr>
-            <a:spLocks noGrp="1"/>
-          </p:cNvSpPr>
-          <p:nvPr>
-            <p:ph type="body" idx="1"/>
-          </p:nvPr>
-        </p:nvSpPr>
-        <p:spPr>
-          <a:xfrm>
-            <a:off x="685800" y="1276350"/>
-            <a:ext cx="7772400" cy="1125140"/>
-          </a:xfrm>
-        </p:spPr>
-        <p:txBody>
-          <a:bodyPr/>
-          <a:lstStyle/>
-          <a:p>
-            <a:r>
-              <a:rPr lang="en-US" dirty="0"/>
-              <a:t>Part 6</a:t>
-            </a:r>
-          </a:p>
-        </p:txBody>
-      </p:sp>
-      <p:sp>
-        <p:nvSpPr>
-          <p:cNvPr id="7" name="TextBox 6">
-            <a:extLst>
-              <a:ext uri="{FF2B5EF4-FFF2-40B4-BE49-F238E27FC236}">
-                <a16:creationId xmlns:a16="http://schemas.microsoft.com/office/drawing/2014/main" id="{43A0B979-06BF-49A8-BE30-6AF60959430A}"/>
-              </a:ext>
-            </a:extLst>
-          </p:cNvPr>
-          <p:cNvSpPr txBox="1"/>
-          <p:nvPr/>
-        </p:nvSpPr>
-        <p:spPr>
-          <a:xfrm>
-            <a:off x="210207" y="4263628"/>
-            <a:ext cx="4585716" cy="369332"/>
-          </a:xfrm>
-          <a:prstGeom prst="rect">
-            <a:avLst/>
-          </a:prstGeom>
-          <a:noFill/>
-        </p:spPr>
-        <p:txBody>
-          <a:bodyPr wrap="square">
-            <a:spAutoFit/>
-          </a:bodyPr>
-          <a:lstStyle/>
-          <a:p>
-            <a:pPr algn="ctr"/>
-            <a:r>
-              <a:rPr lang="en-US" sz="1800" dirty="0">
-                <a:solidFill>
-                  <a:srgbClr val="0070C0"/>
-                </a:solidFill>
-              </a:rPr>
-              <a:t>Some Backup Material Follows</a:t>
-            </a:r>
-          </a:p>
-        </p:txBody>
-      </p:sp>
-      <p:sp>
-        <p:nvSpPr>
-          <p:cNvPr id="8" name="Flowchart: Terminator 7">
-            <a:extLst>
-              <a:ext uri="{FF2B5EF4-FFF2-40B4-BE49-F238E27FC236}">
-                <a16:creationId xmlns:a16="http://schemas.microsoft.com/office/drawing/2014/main" id="{D5B6B643-3540-412D-93BD-BBF067F58B1B}"/>
-              </a:ext>
-            </a:extLst>
-          </p:cNvPr>
-          <p:cNvSpPr/>
-          <p:nvPr/>
-        </p:nvSpPr>
-        <p:spPr>
-          <a:xfrm>
-            <a:off x="7467600" y="4552950"/>
-            <a:ext cx="1103376" cy="228600"/>
-          </a:xfrm>
-          <a:prstGeom prst="flowChartTerminator">
-            <a:avLst/>
-          </a:prstGeom>
-          <a:solidFill>
-            <a:schemeClr val="accent3">
-              <a:lumMod val="20000"/>
-              <a:lumOff val="80000"/>
-            </a:schemeClr>
-          </a:solidFill>
-          <a:ln>
-            <a:solidFill>
-              <a:schemeClr val="accent3">
-                <a:lumMod val="60000"/>
-                <a:lumOff val="40000"/>
-              </a:schemeClr>
-            </a:solidFill>
-          </a:ln>
-        </p:spPr>
-        <p:style>
-          <a:lnRef idx="2">
-            <a:schemeClr val="accent1">
-              <a:shade val="50000"/>
-            </a:schemeClr>
-          </a:lnRef>
-          <a:fillRef idx="1">
-            <a:schemeClr val="accent1"/>
-          </a:fillRef>
-          <a:effectRef idx="0">
-            <a:schemeClr val="accent1"/>
-          </a:effectRef>
-          <a:fontRef idx="minor">
-            <a:schemeClr val="lt1"/>
-          </a:fontRef>
-        </p:style>
-        <p:txBody>
-          <a:bodyPr rtlCol="0" anchor="ctr"/>
-          <a:lstStyle/>
-          <a:p>
-            <a:pPr algn="ctr"/>
-            <a:r>
-              <a:rPr lang="en-US" sz="1000" dirty="0">
-                <a:solidFill>
-                  <a:schemeClr val="tx1"/>
-                </a:solidFill>
-                <a:hlinkClick r:id="rId3" action="ppaction://hlinksldjump"/>
-              </a:rPr>
-              <a:t>Back to Agenda</a:t>
-            </a:r>
-            <a:endParaRPr lang="en-US" sz="1000" dirty="0">
-              <a:solidFill>
-                <a:schemeClr val="tx1"/>
-              </a:solidFill>
-            </a:endParaRPr>
-          </a:p>
-        </p:txBody>
-      </p:sp>
-    </p:spTree>
-    <p:extLst>
-      <p:ext uri="{BB962C8B-B14F-4D97-AF65-F5344CB8AC3E}">
-        <p14:creationId xmlns:p14="http://schemas.microsoft.com/office/powerpoint/2010/main" val="2830109214"/>
-      </p:ext>
-    </p:extLst>
-  </p:cSld>
-  <p:clrMapOvr>
-    <a:masterClrMapping/>
-  </p:clrMapOvr>
-</p:sld>
-</file>
-
 <file path=ppt/slides/slide8.xml><?xml version="1.0" encoding="utf-8"?>
 <p:sld xmlns:a="http://schemas.openxmlformats.org/drawingml/2006/main" xmlns:r="http://schemas.openxmlformats.org/officeDocument/2006/relationships" xmlns:p="http://schemas.openxmlformats.org/presentationml/2006/main">
   <p:cSld>
@@ -6080,50 +8617,502 @@
       </p:grpSpPr>
       <p:sp>
         <p:nvSpPr>
-          <p:cNvPr id="4" name="Title 3">
+          <p:cNvPr id="2" name="Title 1"/>
+          <p:cNvSpPr>
+            <a:spLocks noGrp="1"/>
+          </p:cNvSpPr>
+          <p:nvPr>
+            <p:ph type="title"/>
+          </p:nvPr>
+        </p:nvSpPr>
+        <p:spPr/>
+        <p:txBody>
+          <a:bodyPr>
+            <a:normAutofit/>
+          </a:bodyPr>
+          <a:lstStyle/>
+          <a:p>
+            <a:r>
+              <a:rPr lang="en-US" dirty="0"/>
+              <a:t>Turntable – </a:t>
+            </a:r>
+            <a:r>
+              <a:rPr lang="en-US" dirty="0">
+                <a:solidFill>
+                  <a:srgbClr val="FFFF00"/>
+                </a:solidFill>
+              </a:rPr>
+              <a:t>Physical Basis</a:t>
+            </a:r>
+          </a:p>
+        </p:txBody>
+      </p:sp>
+      <p:sp>
+        <p:nvSpPr>
+          <p:cNvPr id="3" name="Content Placeholder 2"/>
+          <p:cNvSpPr>
+            <a:spLocks noGrp="1"/>
+          </p:cNvSpPr>
+          <p:nvPr>
+            <p:ph idx="1"/>
+          </p:nvPr>
+        </p:nvSpPr>
+        <p:spPr>
+          <a:xfrm>
+            <a:off x="448964" y="1350111"/>
+            <a:ext cx="8428335" cy="3417152"/>
+          </a:xfrm>
+        </p:spPr>
+        <p:txBody>
+          <a:bodyPr>
+            <a:normAutofit/>
+          </a:bodyPr>
+          <a:lstStyle/>
+          <a:p>
+            <a:pPr marL="0" indent="0">
+              <a:buNone/>
+            </a:pPr>
+            <a:r>
+              <a:rPr lang="en-US" dirty="0"/>
+              <a:t>As it happens </a:t>
+            </a:r>
+            <a:r>
+              <a:rPr lang="en-US" dirty="0" err="1"/>
+              <a:t>Meino</a:t>
+            </a:r>
+            <a:r>
+              <a:rPr lang="en-US" dirty="0"/>
+              <a:t> and Alan both used the same physical kit – PECO LK-55</a:t>
+            </a:r>
+          </a:p>
+          <a:p>
+            <a:pPr marL="0" indent="0">
+              <a:buNone/>
+            </a:pPr>
+            <a:r>
+              <a:rPr lang="en-US" dirty="0"/>
+              <a:t> </a:t>
+            </a:r>
+          </a:p>
+        </p:txBody>
+      </p:sp>
+      <p:pic>
+        <p:nvPicPr>
+          <p:cNvPr id="4" name="Picture 3">
             <a:extLst>
               <a:ext uri="{FF2B5EF4-FFF2-40B4-BE49-F238E27FC236}">
-                <a16:creationId xmlns:a16="http://schemas.microsoft.com/office/drawing/2014/main" id="{BDE6CE25-34FB-4714-9DAA-1CEAE47154BE}"/>
+                <a16:creationId xmlns:a16="http://schemas.microsoft.com/office/drawing/2014/main" id="{8CBCA567-7F2C-4256-9D8B-A87EC4D25AAB}"/>
               </a:ext>
             </a:extLst>
           </p:cNvPr>
-          <p:cNvSpPr>
-            <a:spLocks noGrp="1"/>
-          </p:cNvSpPr>
-          <p:nvPr>
-            <p:ph type="title"/>
-          </p:nvPr>
-        </p:nvSpPr>
+          <p:cNvPicPr>
+            <a:picLocks noChangeAspect="1"/>
+          </p:cNvPicPr>
+          <p:nvPr/>
+        </p:nvPicPr>
+        <p:blipFill>
+          <a:blip r:embed="rId3" cstate="screen">
+            <a:extLst>
+              <a:ext uri="{28A0092B-C50C-407E-A947-70E740481C1C}">
+                <a14:useLocalDpi xmlns:a14="http://schemas.microsoft.com/office/drawing/2010/main"/>
+              </a:ext>
+            </a:extLst>
+          </a:blip>
+          <a:stretch>
+            <a:fillRect/>
+          </a:stretch>
+        </p:blipFill>
         <p:spPr>
           <a:xfrm>
-            <a:off x="659756" y="2416323"/>
-            <a:ext cx="8345486" cy="1021556"/>
+            <a:off x="7848600" y="4583336"/>
+            <a:ext cx="1028700" cy="457771"/>
           </a:xfrm>
+          <a:prstGeom prst="rect">
+            <a:avLst/>
+          </a:prstGeom>
         </p:spPr>
-        <p:txBody>
-          <a:bodyPr>
-            <a:normAutofit fontScale="90000"/>
-          </a:bodyPr>
-          <a:lstStyle/>
-          <a:p>
-            <a:r>
-              <a:rPr lang="en-US" dirty="0"/>
-              <a:t>Backup Material</a:t>
-            </a:r>
-            <a:br>
-              <a:rPr lang="en-US" dirty="0"/>
-            </a:br>
-            <a:br>
-              <a:rPr lang="en-US" dirty="0"/>
-            </a:br>
-            <a:endParaRPr lang="en-US" dirty="0"/>
-          </a:p>
-        </p:txBody>
-      </p:sp>
+      </p:pic>
+      <p:pic>
+        <p:nvPicPr>
+          <p:cNvPr id="8" name="Picture 7">
+            <a:extLst>
+              <a:ext uri="{FF2B5EF4-FFF2-40B4-BE49-F238E27FC236}">
+                <a16:creationId xmlns:a16="http://schemas.microsoft.com/office/drawing/2014/main" id="{0183FF41-D6AE-BCB5-B5F6-657E5B4CB008}"/>
+              </a:ext>
+            </a:extLst>
+          </p:cNvPr>
+          <p:cNvPicPr>
+            <a:picLocks noChangeAspect="1"/>
+          </p:cNvPicPr>
+          <p:nvPr/>
+        </p:nvPicPr>
+        <p:blipFill>
+          <a:blip r:embed="rId4"/>
+          <a:stretch>
+            <a:fillRect/>
+          </a:stretch>
+        </p:blipFill>
+        <p:spPr>
+          <a:xfrm>
+            <a:off x="685800" y="2476500"/>
+            <a:ext cx="3276600" cy="2457450"/>
+          </a:xfrm>
+          <a:prstGeom prst="rect">
+            <a:avLst/>
+          </a:prstGeom>
+        </p:spPr>
+      </p:pic>
+      <p:grpSp>
+        <p:nvGrpSpPr>
+          <p:cNvPr id="10" name="Group 9">
+            <a:extLst>
+              <a:ext uri="{FF2B5EF4-FFF2-40B4-BE49-F238E27FC236}">
+                <a16:creationId xmlns:a16="http://schemas.microsoft.com/office/drawing/2014/main" id="{FBD56D6E-151E-4A92-7ED7-00EEFB39C9D7}"/>
+              </a:ext>
+            </a:extLst>
+          </p:cNvPr>
+          <p:cNvGrpSpPr/>
+          <p:nvPr/>
+        </p:nvGrpSpPr>
+        <p:grpSpPr>
+          <a:xfrm>
+            <a:off x="3519630" y="2465785"/>
+            <a:ext cx="4356679" cy="2438400"/>
+            <a:chOff x="3519630" y="2465785"/>
+            <a:chExt cx="4356679" cy="2438400"/>
+          </a:xfrm>
+        </p:grpSpPr>
+        <p:pic>
+          <p:nvPicPr>
+            <p:cNvPr id="6" name="Picture 5">
+              <a:extLst>
+                <a:ext uri="{FF2B5EF4-FFF2-40B4-BE49-F238E27FC236}">
+                  <a16:creationId xmlns:a16="http://schemas.microsoft.com/office/drawing/2014/main" id="{3C73884E-72D2-C0AF-52E7-C6C6C4DC167E}"/>
+                </a:ext>
+              </a:extLst>
+            </p:cNvPr>
+            <p:cNvPicPr>
+              <a:picLocks noChangeAspect="1"/>
+            </p:cNvPicPr>
+            <p:nvPr/>
+          </p:nvPicPr>
+          <p:blipFill>
+            <a:blip r:embed="rId5"/>
+            <a:stretch>
+              <a:fillRect/>
+            </a:stretch>
+          </p:blipFill>
+          <p:spPr>
+            <a:xfrm>
+              <a:off x="4625109" y="2465785"/>
+              <a:ext cx="3251200" cy="2438400"/>
+            </a:xfrm>
+            <a:prstGeom prst="rect">
+              <a:avLst/>
+            </a:prstGeom>
+          </p:spPr>
+        </p:pic>
+        <p:sp>
+          <p:nvSpPr>
+            <p:cNvPr id="9" name="Arrow: Curved Down 8">
+              <a:extLst>
+                <a:ext uri="{FF2B5EF4-FFF2-40B4-BE49-F238E27FC236}">
+                  <a16:creationId xmlns:a16="http://schemas.microsoft.com/office/drawing/2014/main" id="{E67A0294-E1A7-FCF3-6335-D77F1E25A211}"/>
+                </a:ext>
+              </a:extLst>
+            </p:cNvPr>
+            <p:cNvSpPr/>
+            <p:nvPr/>
+          </p:nvSpPr>
+          <p:spPr>
+            <a:xfrm>
+              <a:off x="3519630" y="2800350"/>
+              <a:ext cx="1548249" cy="838200"/>
+            </a:xfrm>
+            <a:prstGeom prst="curvedDownArrow">
+              <a:avLst/>
+            </a:prstGeom>
+            <a:solidFill>
+              <a:srgbClr val="FFFF00"/>
+            </a:solidFill>
+          </p:spPr>
+          <p:style>
+            <a:lnRef idx="2">
+              <a:schemeClr val="accent1">
+                <a:shade val="50000"/>
+              </a:schemeClr>
+            </a:lnRef>
+            <a:fillRef idx="1">
+              <a:schemeClr val="accent1"/>
+            </a:fillRef>
+            <a:effectRef idx="0">
+              <a:schemeClr val="accent1"/>
+            </a:effectRef>
+            <a:fontRef idx="minor">
+              <a:schemeClr val="lt1"/>
+            </a:fontRef>
+          </p:style>
+          <p:txBody>
+            <a:bodyPr rtlCol="0" anchor="ctr"/>
+            <a:lstStyle/>
+            <a:p>
+              <a:pPr algn="ctr"/>
+              <a:endParaRPr lang="en-US">
+                <a:solidFill>
+                  <a:schemeClr val="tx1"/>
+                </a:solidFill>
+              </a:endParaRPr>
+            </a:p>
+          </p:txBody>
+        </p:sp>
+      </p:grpSp>
     </p:spTree>
     <p:extLst>
       <p:ext uri="{BB962C8B-B14F-4D97-AF65-F5344CB8AC3E}">
-        <p14:creationId xmlns:p14="http://schemas.microsoft.com/office/powerpoint/2010/main" val="3619457423"/>
+        <p14:creationId xmlns:p14="http://schemas.microsoft.com/office/powerpoint/2010/main" val="2480336385"/>
+      </p:ext>
+    </p:extLst>
+  </p:cSld>
+  <p:clrMapOvr>
+    <a:masterClrMapping/>
+  </p:clrMapOvr>
+  <p:timing>
+    <p:tnLst>
+      <p:par>
+        <p:cTn id="1" dur="indefinite" restart="never" nodeType="tmRoot">
+          <p:childTnLst>
+            <p:seq concurrent="1" nextAc="seek">
+              <p:cTn id="2" dur="indefinite" nodeType="mainSeq">
+                <p:childTnLst>
+                  <p:par>
+                    <p:cTn id="3" fill="hold">
+                      <p:stCondLst>
+                        <p:cond delay="indefinite"/>
+                      </p:stCondLst>
+                      <p:childTnLst>
+                        <p:par>
+                          <p:cTn id="4" fill="hold">
+                            <p:stCondLst>
+                              <p:cond delay="0"/>
+                            </p:stCondLst>
+                            <p:childTnLst>
+                              <p:par>
+                                <p:cTn id="5" presetID="10" presetClass="entr" presetSubtype="0" fill="hold" nodeType="clickEffect">
+                                  <p:stCondLst>
+                                    <p:cond delay="0"/>
+                                  </p:stCondLst>
+                                  <p:childTnLst>
+                                    <p:set>
+                                      <p:cBhvr>
+                                        <p:cTn id="6" dur="1" fill="hold">
+                                          <p:stCondLst>
+                                            <p:cond delay="0"/>
+                                          </p:stCondLst>
+                                        </p:cTn>
+                                        <p:tgtEl>
+                                          <p:spTgt spid="10"/>
+                                        </p:tgtEl>
+                                        <p:attrNameLst>
+                                          <p:attrName>style.visibility</p:attrName>
+                                        </p:attrNameLst>
+                                      </p:cBhvr>
+                                      <p:to>
+                                        <p:strVal val="visible"/>
+                                      </p:to>
+                                    </p:set>
+                                    <p:animEffect transition="in" filter="fade">
+                                      <p:cBhvr>
+                                        <p:cTn id="7" dur="500"/>
+                                        <p:tgtEl>
+                                          <p:spTgt spid="10"/>
+                                        </p:tgtEl>
+                                      </p:cBhvr>
+                                    </p:animEffect>
+                                  </p:childTnLst>
+                                </p:cTn>
+                              </p:par>
+                            </p:childTnLst>
+                          </p:cTn>
+                        </p:par>
+                      </p:childTnLst>
+                    </p:cTn>
+                  </p:par>
+                </p:childTnLst>
+              </p:cTn>
+              <p:prevCondLst>
+                <p:cond evt="onPrev" delay="0">
+                  <p:tgtEl>
+                    <p:sldTgt/>
+                  </p:tgtEl>
+                </p:cond>
+              </p:prevCondLst>
+              <p:nextCondLst>
+                <p:cond evt="onNext" delay="0">
+                  <p:tgtEl>
+                    <p:sldTgt/>
+                  </p:tgtEl>
+                </p:cond>
+              </p:nextCondLst>
+            </p:seq>
+          </p:childTnLst>
+        </p:cTn>
+      </p:par>
+    </p:tnLst>
+  </p:timing>
+</p:sld>
+</file>
+
+<file path=ppt/slides/slide9.xml><?xml version="1.0" encoding="utf-8"?>
+<p:sld xmlns:a="http://schemas.openxmlformats.org/drawingml/2006/main" xmlns:r="http://schemas.openxmlformats.org/officeDocument/2006/relationships" xmlns:p="http://schemas.openxmlformats.org/presentationml/2006/main">
+  <p:cSld>
+    <p:spTree>
+      <p:nvGrpSpPr>
+        <p:cNvPr id="1" name=""/>
+        <p:cNvGrpSpPr/>
+        <p:nvPr/>
+      </p:nvGrpSpPr>
+      <p:grpSpPr>
+        <a:xfrm>
+          <a:off x="0" y="0"/>
+          <a:ext cx="0" cy="0"/>
+          <a:chOff x="0" y="0"/>
+          <a:chExt cx="0" cy="0"/>
+        </a:xfrm>
+      </p:grpSpPr>
+      <p:sp>
+        <p:nvSpPr>
+          <p:cNvPr id="2" name="Title 1"/>
+          <p:cNvSpPr>
+            <a:spLocks noGrp="1"/>
+          </p:cNvSpPr>
+          <p:nvPr>
+            <p:ph type="title"/>
+          </p:nvPr>
+        </p:nvSpPr>
+        <p:spPr/>
+        <p:txBody>
+          <a:bodyPr>
+            <a:normAutofit/>
+          </a:bodyPr>
+          <a:lstStyle/>
+          <a:p>
+            <a:r>
+              <a:rPr lang="en-US" dirty="0"/>
+              <a:t>Turntable – </a:t>
+            </a:r>
+            <a:r>
+              <a:rPr lang="en-US" dirty="0">
+                <a:solidFill>
+                  <a:srgbClr val="FFFF00"/>
+                </a:solidFill>
+              </a:rPr>
+              <a:t>Physical Basis</a:t>
+            </a:r>
+          </a:p>
+        </p:txBody>
+      </p:sp>
+      <p:sp>
+        <p:nvSpPr>
+          <p:cNvPr id="3" name="Content Placeholder 2"/>
+          <p:cNvSpPr>
+            <a:spLocks noGrp="1"/>
+          </p:cNvSpPr>
+          <p:nvPr>
+            <p:ph idx="1"/>
+          </p:nvPr>
+        </p:nvSpPr>
+        <p:spPr>
+          <a:xfrm>
+            <a:off x="448964" y="1350111"/>
+            <a:ext cx="8428335" cy="3417152"/>
+          </a:xfrm>
+        </p:spPr>
+        <p:txBody>
+          <a:bodyPr>
+            <a:normAutofit/>
+          </a:bodyPr>
+          <a:lstStyle/>
+          <a:p>
+            <a:pPr marL="0" indent="0">
+              <a:buNone/>
+            </a:pPr>
+            <a:endParaRPr lang="en-US" dirty="0"/>
+          </a:p>
+          <a:p>
+            <a:pPr marL="0" indent="0">
+              <a:buNone/>
+            </a:pPr>
+            <a:r>
+              <a:rPr lang="en-US" dirty="0"/>
+              <a:t>Beyond this we went about it independently. </a:t>
+            </a:r>
+          </a:p>
+          <a:p>
+            <a:pPr marL="0" indent="0">
+              <a:buNone/>
+            </a:pPr>
+            <a:r>
+              <a:rPr lang="en-US" dirty="0"/>
+              <a:t>In fact we only became aware of each others turntable project at a December Arduino SIG</a:t>
+            </a:r>
+          </a:p>
+          <a:p>
+            <a:pPr marL="0" indent="0">
+              <a:buNone/>
+            </a:pPr>
+            <a:endParaRPr lang="en-US" dirty="0"/>
+          </a:p>
+          <a:p>
+            <a:pPr marL="0" indent="0">
+              <a:buNone/>
+            </a:pPr>
+            <a:r>
+              <a:rPr lang="en-US" dirty="0"/>
+              <a:t>So … we will now show our solutions in a bit more detail.</a:t>
+            </a:r>
+          </a:p>
+        </p:txBody>
+      </p:sp>
+      <p:pic>
+        <p:nvPicPr>
+          <p:cNvPr id="4" name="Picture 3">
+            <a:extLst>
+              <a:ext uri="{FF2B5EF4-FFF2-40B4-BE49-F238E27FC236}">
+                <a16:creationId xmlns:a16="http://schemas.microsoft.com/office/drawing/2014/main" id="{8CBCA567-7F2C-4256-9D8B-A87EC4D25AAB}"/>
+              </a:ext>
+            </a:extLst>
+          </p:cNvPr>
+          <p:cNvPicPr>
+            <a:picLocks noChangeAspect="1"/>
+          </p:cNvPicPr>
+          <p:nvPr/>
+        </p:nvPicPr>
+        <p:blipFill>
+          <a:blip r:embed="rId3" cstate="screen">
+            <a:extLst>
+              <a:ext uri="{28A0092B-C50C-407E-A947-70E740481C1C}">
+                <a14:useLocalDpi xmlns:a14="http://schemas.microsoft.com/office/drawing/2010/main"/>
+              </a:ext>
+            </a:extLst>
+          </a:blip>
+          <a:stretch>
+            <a:fillRect/>
+          </a:stretch>
+        </p:blipFill>
+        <p:spPr>
+          <a:xfrm>
+            <a:off x="7848600" y="4583336"/>
+            <a:ext cx="1028700" cy="457771"/>
+          </a:xfrm>
+          <a:prstGeom prst="rect">
+            <a:avLst/>
+          </a:prstGeom>
+        </p:spPr>
+      </p:pic>
+    </p:spTree>
+    <p:extLst>
+      <p:ext uri="{BB962C8B-B14F-4D97-AF65-F5344CB8AC3E}">
+        <p14:creationId xmlns:p14="http://schemas.microsoft.com/office/powerpoint/2010/main" val="1699251923"/>
       </p:ext>
     </p:extLst>
   </p:cSld>

</xml_diff>